<commit_message>
added the temp ppt and guide
</commit_message>
<xml_diff>
--- a/SQL/Day 4 Joins/Joins.pptx
+++ b/SQL/Day 4 Joins/Joins.pptx
@@ -8,10 +8,10 @@
     <p:sldMasterId id="2147493470" r:id="rId7"/>
   </p:sldMasterIdLst>
   <p:notesMasterIdLst>
-    <p:notesMasterId r:id="rId42"/>
+    <p:notesMasterId r:id="rId39"/>
   </p:notesMasterIdLst>
   <p:handoutMasterIdLst>
-    <p:handoutMasterId r:id="rId43"/>
+    <p:handoutMasterId r:id="rId40"/>
   </p:handoutMasterIdLst>
   <p:sldIdLst>
     <p:sldId id="256" r:id="rId8"/>
@@ -39,15 +39,12 @@
     <p:sldId id="420" r:id="rId30"/>
     <p:sldId id="467" r:id="rId31"/>
     <p:sldId id="468" r:id="rId32"/>
-    <p:sldId id="437" r:id="rId33"/>
-    <p:sldId id="440" r:id="rId34"/>
-    <p:sldId id="438" r:id="rId35"/>
-    <p:sldId id="442" r:id="rId36"/>
-    <p:sldId id="404" r:id="rId37"/>
-    <p:sldId id="340" r:id="rId38"/>
-    <p:sldId id="463" r:id="rId39"/>
-    <p:sldId id="444" r:id="rId40"/>
-    <p:sldId id="464" r:id="rId41"/>
+    <p:sldId id="469" r:id="rId33"/>
+    <p:sldId id="404" r:id="rId34"/>
+    <p:sldId id="340" r:id="rId35"/>
+    <p:sldId id="463" r:id="rId36"/>
+    <p:sldId id="444" r:id="rId37"/>
+    <p:sldId id="464" r:id="rId38"/>
   </p:sldIdLst>
   <p:sldSz cx="9144000" cy="6858000" type="screen4x3"/>
   <p:notesSz cx="7010400" cy="9296400"/>
@@ -236,16 +233,10 @@
             <p14:sldId id="468"/>
           </p14:sldIdLst>
         </p14:section>
-        <p14:section name="Join With Aggregates" id="{0738CA60-406A-1F4D-8B95-1E727DA0FE07}">
+        <p14:section name="Summary" id="{5F32AEFE-A1A0-8A48-A42C-FF84CADA5A4C}">
           <p14:sldIdLst>
-            <p14:sldId id="437"/>
-            <p14:sldId id="440"/>
-            <p14:sldId id="438"/>
-            <p14:sldId id="442"/>
+            <p14:sldId id="469"/>
           </p14:sldIdLst>
-        </p14:section>
-        <p14:section name="Summary" id="{5F32AEFE-A1A0-8A48-A42C-FF84CADA5A4C}">
-          <p14:sldIdLst/>
         </p14:section>
         <p14:section name="Hands On Examples" id="{94B4DAB3-0118-0F4E-8E94-2BB8ACE9EF48}">
           <p14:sldIdLst>
@@ -3272,7 +3263,7 @@
               <a:buChar char="•"/>
             </a:pPr>
             <a:r>
-              <a:rPr lang="en-US" b="1" i="0">
+              <a:rPr lang="en-US" b="1" i="0" dirty="0">
                 <a:solidFill>
                   <a:srgbClr val="374151"/>
                 </a:solidFill>
@@ -3282,7 +3273,7 @@
               <a:t>Inheriting Code:</a:t>
             </a:r>
             <a:r>
-              <a:rPr lang="en-US" b="0" i="0">
+              <a:rPr lang="en-US" b="0" i="0" dirty="0">
                 <a:solidFill>
                   <a:srgbClr val="374151"/>
                 </a:solidFill>
@@ -3293,7 +3284,7 @@
             </a:r>
           </a:p>
           <a:p>
-            <a:endParaRPr lang="en-US"/>
+            <a:endParaRPr lang="en-US" dirty="0"/>
           </a:p>
         </p:txBody>
       </p:sp>
@@ -4823,7 +4814,13 @@
   <p:cSld>
     <p:spTree>
       <p:nvGrpSpPr>
-        <p:cNvPr id="1" name=""/>
+        <p:cNvPr id="1" name="">
+          <a:extLst>
+            <a:ext uri="{FF2B5EF4-FFF2-40B4-BE49-F238E27FC236}">
+              <a16:creationId xmlns:a16="http://schemas.microsoft.com/office/drawing/2014/main" id="{A48EF33B-04D4-1F33-4C86-003DBD67BF27}"/>
+            </a:ext>
+          </a:extLst>
+        </p:cNvPr>
         <p:cNvGrpSpPr/>
         <p:nvPr/>
       </p:nvGrpSpPr>
@@ -4837,7 +4834,13 @@
       </p:grpSpPr>
       <p:sp>
         <p:nvSpPr>
-          <p:cNvPr id="2" name="Slide Image Placeholder 1"/>
+          <p:cNvPr id="2" name="Slide Image Placeholder 1">
+            <a:extLst>
+              <a:ext uri="{FF2B5EF4-FFF2-40B4-BE49-F238E27FC236}">
+                <a16:creationId xmlns:a16="http://schemas.microsoft.com/office/drawing/2014/main" id="{A35CE008-00F3-CA6B-44AB-7BACCA3E76B9}"/>
+              </a:ext>
+            </a:extLst>
+          </p:cNvPr>
           <p:cNvSpPr>
             <a:spLocks noGrp="1" noRot="1" noChangeAspect="1"/>
           </p:cNvSpPr>
@@ -4849,7 +4852,13 @@
       </p:sp>
       <p:sp>
         <p:nvSpPr>
-          <p:cNvPr id="3" name="Notes Placeholder 2"/>
+          <p:cNvPr id="3" name="Notes Placeholder 2">
+            <a:extLst>
+              <a:ext uri="{FF2B5EF4-FFF2-40B4-BE49-F238E27FC236}">
+                <a16:creationId xmlns:a16="http://schemas.microsoft.com/office/drawing/2014/main" id="{027F8B5C-2241-EE86-81B1-D79682321B29}"/>
+              </a:ext>
+            </a:extLst>
+          </p:cNvPr>
           <p:cNvSpPr>
             <a:spLocks noGrp="1"/>
           </p:cNvSpPr>
@@ -4862,16 +4871,168 @@
           <a:bodyPr/>
           <a:lstStyle/>
           <a:p>
-            <a:r>
-              <a:rPr lang="en-US" dirty="0"/>
-              <a:t>Walk through each function</a:t>
-            </a:r>
+            <a:pPr algn="l"/>
+            <a:r>
+              <a:rPr lang="en-US" b="1" i="0" dirty="0">
+                <a:solidFill>
+                  <a:srgbClr val="374151"/>
+                </a:solidFill>
+                <a:effectLst/>
+                <a:latin typeface="Söhne"/>
+              </a:rPr>
+              <a:t>Speaker Notes:</a:t>
+            </a:r>
+            <a:endParaRPr lang="en-US" b="0" i="0" dirty="0">
+              <a:solidFill>
+                <a:srgbClr val="374151"/>
+              </a:solidFill>
+              <a:effectLst/>
+              <a:latin typeface="Söhne"/>
+            </a:endParaRPr>
+          </a:p>
+          <a:p>
+            <a:pPr algn="l">
+              <a:buFont typeface="Arial" panose="020B0604020202020204" pitchFamily="34" charset="0"/>
+              <a:buChar char="•"/>
+            </a:pPr>
+            <a:r>
+              <a:rPr lang="en-US" b="0" i="0" dirty="0">
+                <a:solidFill>
+                  <a:srgbClr val="374151"/>
+                </a:solidFill>
+                <a:effectLst/>
+                <a:latin typeface="Söhne"/>
+              </a:rPr>
+              <a:t>As we conclude our journey through SQL JOINs, here are the key takeaways:</a:t>
+            </a:r>
+          </a:p>
+          <a:p>
+            <a:pPr marL="742950" lvl="1" indent="-285750" algn="l">
+              <a:buFont typeface="Arial" panose="020B0604020202020204" pitchFamily="34" charset="0"/>
+              <a:buChar char="•"/>
+            </a:pPr>
+            <a:r>
+              <a:rPr lang="en-US" b="0" i="0" dirty="0">
+                <a:solidFill>
+                  <a:srgbClr val="374151"/>
+                </a:solidFill>
+                <a:effectLst/>
+                <a:latin typeface="Söhne"/>
+              </a:rPr>
+              <a:t>SQL JOINs are a powerful tool for combining data from multiple tables.</a:t>
+            </a:r>
+          </a:p>
+          <a:p>
+            <a:pPr marL="742950" lvl="1" indent="-285750" algn="l">
+              <a:buFont typeface="Arial" panose="020B0604020202020204" pitchFamily="34" charset="0"/>
+              <a:buChar char="•"/>
+            </a:pPr>
+            <a:r>
+              <a:rPr lang="en-US" b="0" i="0" dirty="0">
+                <a:solidFill>
+                  <a:srgbClr val="374151"/>
+                </a:solidFill>
+                <a:effectLst/>
+                <a:latin typeface="Söhne"/>
+              </a:rPr>
+              <a:t>INNER JOIN is perfect for connected data, ensuring only related records are included.</a:t>
+            </a:r>
+          </a:p>
+          <a:p>
+            <a:pPr marL="742950" lvl="1" indent="-285750" algn="l">
+              <a:buFont typeface="Arial" panose="020B0604020202020204" pitchFamily="34" charset="0"/>
+              <a:buChar char="•"/>
+            </a:pPr>
+            <a:r>
+              <a:rPr lang="en-US" b="0" i="0" dirty="0">
+                <a:solidFill>
+                  <a:srgbClr val="374151"/>
+                </a:solidFill>
+                <a:effectLst/>
+                <a:latin typeface="Söhne"/>
+              </a:rPr>
+              <a:t>LEFT JOIN preserves all records from the left table, while RIGHT JOIN does the same for the right table.</a:t>
+            </a:r>
+          </a:p>
+          <a:p>
+            <a:pPr marL="742950" lvl="1" indent="-285750" algn="l">
+              <a:buFont typeface="Arial" panose="020B0604020202020204" pitchFamily="34" charset="0"/>
+              <a:buChar char="•"/>
+            </a:pPr>
+            <a:r>
+              <a:rPr lang="en-US" b="0" i="0" dirty="0">
+                <a:solidFill>
+                  <a:srgbClr val="374151"/>
+                </a:solidFill>
+                <a:effectLst/>
+                <a:latin typeface="Söhne"/>
+              </a:rPr>
+              <a:t>FULL OUTER JOIN captures everything, even unmatched rows.</a:t>
+            </a:r>
+          </a:p>
+          <a:p>
+            <a:pPr marL="742950" lvl="1" indent="-285750" algn="l">
+              <a:buFont typeface="Arial" panose="020B0604020202020204" pitchFamily="34" charset="0"/>
+              <a:buChar char="•"/>
+            </a:pPr>
+            <a:r>
+              <a:rPr lang="en-US" b="0" i="0" dirty="0">
+                <a:solidFill>
+                  <a:srgbClr val="374151"/>
+                </a:solidFill>
+                <a:effectLst/>
+                <a:latin typeface="Söhne"/>
+              </a:rPr>
+              <a:t>When using JOIN, INNER JOIN makes your intent explicit.</a:t>
+            </a:r>
+          </a:p>
+          <a:p>
+            <a:pPr marL="742950" lvl="1" indent="-285750" algn="l">
+              <a:buFont typeface="Arial" panose="020B0604020202020204" pitchFamily="34" charset="0"/>
+              <a:buChar char="•"/>
+            </a:pPr>
+            <a:r>
+              <a:rPr lang="en-US" b="0" i="0" dirty="0">
+                <a:solidFill>
+                  <a:srgbClr val="374151"/>
+                </a:solidFill>
+                <a:effectLst/>
+                <a:latin typeface="Söhne"/>
+              </a:rPr>
+              <a:t>LEFT JOIN is the preferred choice in most scenarios, but RIGHT JOIN can have its uses.</a:t>
+            </a:r>
+          </a:p>
+          <a:p>
+            <a:pPr marL="742950" lvl="1" indent="-285750" algn="l">
+              <a:buFont typeface="Arial" panose="020B0604020202020204" pitchFamily="34" charset="0"/>
+              <a:buChar char="•"/>
+            </a:pPr>
+            <a:r>
+              <a:rPr lang="en-US" b="0" i="0" dirty="0">
+                <a:solidFill>
+                  <a:srgbClr val="374151"/>
+                </a:solidFill>
+                <a:effectLst/>
+                <a:latin typeface="Söhne"/>
+              </a:rPr>
+              <a:t>Ultimately, the choice of JOIN type depends on your data relationships and query needs.</a:t>
+            </a:r>
+          </a:p>
+          <a:p>
+            <a:pPr algn="l"/>
+            <a:endParaRPr lang="en-US" dirty="0"/>
           </a:p>
         </p:txBody>
       </p:sp>
       <p:sp>
         <p:nvSpPr>
-          <p:cNvPr id="4" name="Slide Number Placeholder 3"/>
+          <p:cNvPr id="4" name="Slide Number Placeholder 3">
+            <a:extLst>
+              <a:ext uri="{FF2B5EF4-FFF2-40B4-BE49-F238E27FC236}">
+                <a16:creationId xmlns:a16="http://schemas.microsoft.com/office/drawing/2014/main" id="{36EBF6ED-F6C3-9F90-2F75-E7CDA9FD9537}"/>
+              </a:ext>
+            </a:extLst>
+          </p:cNvPr>
           <p:cNvSpPr>
             <a:spLocks noGrp="1"/>
           </p:cNvSpPr>
@@ -4892,7 +5053,7 @@
               <a:pPr>
                 <a:defRPr/>
               </a:pPr>
-              <a:t>32</a:t>
+              <a:t>26</a:t>
             </a:fld>
             <a:endParaRPr lang="en-US" dirty="0"/>
           </a:p>
@@ -4901,7 +5062,7 @@
     </p:spTree>
     <p:extLst>
       <p:ext uri="{BB962C8B-B14F-4D97-AF65-F5344CB8AC3E}">
-        <p14:creationId xmlns:p14="http://schemas.microsoft.com/office/powerpoint/2010/main" val="3313796763"/>
+        <p14:creationId xmlns:p14="http://schemas.microsoft.com/office/powerpoint/2010/main" val="4156878396"/>
       </p:ext>
     </p:extLst>
   </p:cSld>
@@ -4957,15 +5118,7 @@
           <a:p>
             <a:r>
               <a:rPr lang="en-US" dirty="0"/>
-              <a:t>Answers are stored in the Exercise </a:t>
-            </a:r>
-            <a:r>
-              <a:rPr lang="en-US" dirty="0" err="1"/>
-              <a:t>Answers.sql</a:t>
-            </a:r>
-            <a:r>
-              <a:rPr lang="en-US" dirty="0"/>
-              <a:t> file</a:t>
+              <a:t>Walk through each function</a:t>
             </a:r>
           </a:p>
         </p:txBody>
@@ -4993,7 +5146,108 @@
               <a:pPr>
                 <a:defRPr/>
               </a:pPr>
-              <a:t>34</a:t>
+              <a:t>29</a:t>
+            </a:fld>
+            <a:endParaRPr lang="en-US" dirty="0"/>
+          </a:p>
+        </p:txBody>
+      </p:sp>
+    </p:spTree>
+    <p:extLst>
+      <p:ext uri="{BB962C8B-B14F-4D97-AF65-F5344CB8AC3E}">
+        <p14:creationId xmlns:p14="http://schemas.microsoft.com/office/powerpoint/2010/main" val="3313796763"/>
+      </p:ext>
+    </p:extLst>
+  </p:cSld>
+  <p:clrMapOvr>
+    <a:masterClrMapping/>
+  </p:clrMapOvr>
+</p:notes>
+</file>
+
+<file path=ppt/notesSlides/notesSlide28.xml><?xml version="1.0" encoding="utf-8"?>
+<p:notes xmlns:a="http://schemas.openxmlformats.org/drawingml/2006/main" xmlns:r="http://schemas.openxmlformats.org/officeDocument/2006/relationships" xmlns:p="http://schemas.openxmlformats.org/presentationml/2006/main">
+  <p:cSld>
+    <p:spTree>
+      <p:nvGrpSpPr>
+        <p:cNvPr id="1" name=""/>
+        <p:cNvGrpSpPr/>
+        <p:nvPr/>
+      </p:nvGrpSpPr>
+      <p:grpSpPr>
+        <a:xfrm>
+          <a:off x="0" y="0"/>
+          <a:ext cx="0" cy="0"/>
+          <a:chOff x="0" y="0"/>
+          <a:chExt cx="0" cy="0"/>
+        </a:xfrm>
+      </p:grpSpPr>
+      <p:sp>
+        <p:nvSpPr>
+          <p:cNvPr id="2" name="Slide Image Placeholder 1"/>
+          <p:cNvSpPr>
+            <a:spLocks noGrp="1" noRot="1" noChangeAspect="1"/>
+          </p:cNvSpPr>
+          <p:nvPr>
+            <p:ph type="sldImg"/>
+          </p:nvPr>
+        </p:nvSpPr>
+        <p:spPr/>
+      </p:sp>
+      <p:sp>
+        <p:nvSpPr>
+          <p:cNvPr id="3" name="Notes Placeholder 2"/>
+          <p:cNvSpPr>
+            <a:spLocks noGrp="1"/>
+          </p:cNvSpPr>
+          <p:nvPr>
+            <p:ph type="body" idx="1"/>
+          </p:nvPr>
+        </p:nvSpPr>
+        <p:spPr/>
+        <p:txBody>
+          <a:bodyPr/>
+          <a:lstStyle/>
+          <a:p>
+            <a:r>
+              <a:rPr lang="en-US" dirty="0"/>
+              <a:t>Answers are stored in the Exercise </a:t>
+            </a:r>
+            <a:r>
+              <a:rPr lang="en-US" dirty="0" err="1"/>
+              <a:t>Answers.sql</a:t>
+            </a:r>
+            <a:r>
+              <a:rPr lang="en-US" dirty="0"/>
+              <a:t> file</a:t>
+            </a:r>
+          </a:p>
+        </p:txBody>
+      </p:sp>
+      <p:sp>
+        <p:nvSpPr>
+          <p:cNvPr id="4" name="Slide Number Placeholder 3"/>
+          <p:cNvSpPr>
+            <a:spLocks noGrp="1"/>
+          </p:cNvSpPr>
+          <p:nvPr>
+            <p:ph type="sldNum" sz="quarter" idx="5"/>
+          </p:nvPr>
+        </p:nvSpPr>
+        <p:spPr/>
+        <p:txBody>
+          <a:bodyPr/>
+          <a:lstStyle/>
+          <a:p>
+            <a:pPr>
+              <a:defRPr/>
+            </a:pPr>
+            <a:fld id="{D0B7D74D-C969-4920-A7A6-E44C909EE3F2}" type="slidenum">
+              <a:rPr lang="en-US" smtClean="0"/>
+              <a:pPr>
+                <a:defRPr/>
+              </a:pPr>
+              <a:t>31</a:t>
             </a:fld>
             <a:endParaRPr lang="en-US" dirty="0"/>
           </a:p>
@@ -18638,7 +18892,13 @@
   <p:cSld>
     <p:spTree>
       <p:nvGrpSpPr>
-        <p:cNvPr id="1" name=""/>
+        <p:cNvPr id="1" name="">
+          <a:extLst>
+            <a:ext uri="{FF2B5EF4-FFF2-40B4-BE49-F238E27FC236}">
+              <a16:creationId xmlns:a16="http://schemas.microsoft.com/office/drawing/2014/main" id="{44136049-504C-6762-7044-BF03FC98BDD7}"/>
+            </a:ext>
+          </a:extLst>
+        </p:cNvPr>
         <p:cNvGrpSpPr/>
         <p:nvPr/>
       </p:nvGrpSpPr>
@@ -18655,7 +18915,7 @@
           <p:cNvPr id="8" name="Subtitle 2">
             <a:extLst>
               <a:ext uri="{FF2B5EF4-FFF2-40B4-BE49-F238E27FC236}">
-                <a16:creationId xmlns:a16="http://schemas.microsoft.com/office/drawing/2014/main" id="{090EFA5F-2C72-42AB-A069-51AFDC27C766}"/>
+                <a16:creationId xmlns:a16="http://schemas.microsoft.com/office/drawing/2014/main" id="{7F7BDAB4-5B46-6BD2-09C4-D5599444A930}"/>
               </a:ext>
             </a:extLst>
           </p:cNvPr>
@@ -18857,7 +19117,7 @@
           <p:cNvPr id="5" name="Title 4">
             <a:extLst>
               <a:ext uri="{FF2B5EF4-FFF2-40B4-BE49-F238E27FC236}">
-                <a16:creationId xmlns:a16="http://schemas.microsoft.com/office/drawing/2014/main" id="{B7278418-EB2A-8766-EC92-613B2ACBA277}"/>
+                <a16:creationId xmlns:a16="http://schemas.microsoft.com/office/drawing/2014/main" id="{34A92FDE-E9EA-F055-3CFC-04F9303EBC68}"/>
               </a:ext>
             </a:extLst>
           </p:cNvPr>
@@ -18880,7 +19140,7 @@
           <a:p>
             <a:r>
               <a:rPr lang="en-US" dirty="0"/>
-              <a:t>Joins Enabled Aggregated Analysis</a:t>
+              <a:t>Summary</a:t>
             </a:r>
           </a:p>
         </p:txBody>
@@ -18890,7 +19150,7 @@
           <p:cNvPr id="7" name="Content Placeholder 6">
             <a:extLst>
               <a:ext uri="{FF2B5EF4-FFF2-40B4-BE49-F238E27FC236}">
-                <a16:creationId xmlns:a16="http://schemas.microsoft.com/office/drawing/2014/main" id="{8103113D-3FA7-10C8-CFF6-CF0FA3CF28D4}"/>
+                <a16:creationId xmlns:a16="http://schemas.microsoft.com/office/drawing/2014/main" id="{B8E1F8F4-0CE2-470C-9A81-77B295D591BF}"/>
               </a:ext>
             </a:extLst>
           </p:cNvPr>
@@ -18911,41 +19171,99 @@
           <a:bodyPr/>
           <a:lstStyle/>
           <a:p>
-            <a:r>
-              <a:rPr lang="en-US" b="0" i="0" dirty="0">
-                <a:solidFill>
-                  <a:srgbClr val="1C1917"/>
-                </a:solidFill>
-                <a:effectLst/>
-                <a:latin typeface="-apple-system"/>
-              </a:rPr>
-              <a:t>Blending Joins and Aggregates</a:t>
-            </a:r>
+            <a:pPr algn="l">
+              <a:buFont typeface="Arial" panose="020B0604020202020204" pitchFamily="34" charset="0"/>
+              <a:buChar char="•"/>
+            </a:pPr>
+            <a:r>
+              <a:rPr lang="en-US" b="0" i="0" dirty="0">
+                <a:solidFill>
+                  <a:srgbClr val="374151"/>
+                </a:solidFill>
+                <a:effectLst/>
+                <a:latin typeface="Söhne"/>
+              </a:rPr>
+              <a:t>Mastering SQL Joins:</a:t>
+            </a:r>
+          </a:p>
+          <a:p>
+            <a:pPr algn="l">
+              <a:buFont typeface="Arial" panose="020B0604020202020204" pitchFamily="34" charset="0"/>
+              <a:buChar char="•"/>
+            </a:pPr>
+            <a:endParaRPr lang="en-US" b="0" i="0" dirty="0">
+              <a:solidFill>
+                <a:srgbClr val="374151"/>
+              </a:solidFill>
+              <a:effectLst/>
+              <a:latin typeface="Söhne"/>
+            </a:endParaRPr>
           </a:p>
           <a:p>
             <a:pPr lvl="1"/>
             <a:r>
-              <a:rPr lang="en-US" dirty="0">
-                <a:solidFill>
-                  <a:srgbClr val="1C1917"/>
-                </a:solidFill>
-                <a:latin typeface="-apple-system"/>
-              </a:rPr>
-              <a:t>J</a:t>
-            </a:r>
-            <a:r>
-              <a:rPr lang="en-US" b="0" i="0" dirty="0">
-                <a:solidFill>
-                  <a:srgbClr val="1C1917"/>
-                </a:solidFill>
-                <a:effectLst/>
-                <a:latin typeface="-apple-system"/>
-              </a:rPr>
-              <a:t>oining multiple tables FIRST in a SQL query, and then aggregating the resulted joined data using functions like SUM, COUNT, AVG, etc.</a:t>
+              <a:rPr lang="en-US" b="0" i="0" dirty="0">
+                <a:solidFill>
+                  <a:srgbClr val="374151"/>
+                </a:solidFill>
+                <a:effectLst/>
+                <a:latin typeface="Söhne"/>
+              </a:rPr>
+              <a:t>SQL JOINs allow combining data from multiple tables.</a:t>
             </a:r>
           </a:p>
           <a:p>
             <a:pPr lvl="1"/>
+            <a:endParaRPr lang="en-US" b="0" i="0" dirty="0">
+              <a:solidFill>
+                <a:srgbClr val="374151"/>
+              </a:solidFill>
+              <a:effectLst/>
+              <a:latin typeface="Söhne"/>
+            </a:endParaRPr>
+          </a:p>
+          <a:p>
+            <a:pPr lvl="1"/>
+            <a:r>
+              <a:rPr lang="en-US" b="0" i="0" dirty="0">
+                <a:solidFill>
+                  <a:srgbClr val="374151"/>
+                </a:solidFill>
+                <a:effectLst/>
+                <a:latin typeface="Söhne"/>
+              </a:rPr>
+              <a:t>LEFT vs. RIGHT JOIN: LEFT JOIN is used 95% of the time; RIGHT JOIN may be useful in specific cases.</a:t>
+            </a:r>
+          </a:p>
+          <a:p>
+            <a:pPr lvl="1"/>
+            <a:endParaRPr lang="en-US" b="0" i="0" dirty="0">
+              <a:solidFill>
+                <a:srgbClr val="374151"/>
+              </a:solidFill>
+              <a:effectLst/>
+              <a:latin typeface="Söhne"/>
+            </a:endParaRPr>
+          </a:p>
+          <a:p>
+            <a:pPr lvl="1"/>
+            <a:r>
+              <a:rPr lang="en-US" b="0" i="0" dirty="0">
+                <a:solidFill>
+                  <a:srgbClr val="374151"/>
+                </a:solidFill>
+                <a:effectLst/>
+                <a:latin typeface="Söhne"/>
+              </a:rPr>
+              <a:t>Choose the right JOIN based on your data relationships and query requirements.</a:t>
+            </a:r>
+          </a:p>
+          <a:p>
+            <a:pPr lvl="1">
+              <a:spcBef>
+                <a:spcPts val="0"/>
+              </a:spcBef>
+            </a:pPr>
             <a:endParaRPr lang="en-US" b="0" i="0" dirty="0">
               <a:solidFill>
                 <a:srgbClr val="1C1917"/>
@@ -18954,113 +19272,12 @@
               <a:latin typeface="-apple-system"/>
             </a:endParaRPr>
           </a:p>
-          <a:p>
-            <a:pPr lvl="1"/>
-            <a:endParaRPr lang="en-US" b="0" i="0" dirty="0">
-              <a:solidFill>
-                <a:srgbClr val="1C1917"/>
-              </a:solidFill>
-              <a:effectLst/>
-              <a:latin typeface="-apple-system"/>
-            </a:endParaRPr>
-          </a:p>
-          <a:p>
-            <a:r>
-              <a:rPr lang="en-US" b="0" i="0" dirty="0">
-                <a:solidFill>
-                  <a:srgbClr val="1C1917"/>
-                </a:solidFill>
-                <a:effectLst/>
-                <a:latin typeface="-apple-system"/>
-              </a:rPr>
-              <a:t>For example</a:t>
-            </a:r>
-            <a:r>
-              <a:rPr lang="en-US" dirty="0">
-                <a:solidFill>
-                  <a:srgbClr val="1C1917"/>
-                </a:solidFill>
-                <a:latin typeface="-apple-system"/>
-              </a:rPr>
-              <a:t>:</a:t>
-            </a:r>
-          </a:p>
-          <a:p>
-            <a:pPr lvl="1"/>
-            <a:r>
-              <a:rPr lang="en-US" b="0" i="0" dirty="0">
-                <a:solidFill>
-                  <a:srgbClr val="1C1917"/>
-                </a:solidFill>
-                <a:effectLst/>
-                <a:latin typeface="-apple-system"/>
-              </a:rPr>
-              <a:t>Join a customers table to an orders table</a:t>
-            </a:r>
-          </a:p>
-          <a:p>
-            <a:pPr lvl="2"/>
-            <a:r>
-              <a:rPr lang="en-US" b="0" i="0" dirty="0">
-                <a:solidFill>
-                  <a:srgbClr val="1C1917"/>
-                </a:solidFill>
-                <a:effectLst/>
-                <a:latin typeface="-apple-system"/>
-              </a:rPr>
-              <a:t>Then, aggregate the joined data to summarize rather than seeing individual rows</a:t>
-            </a:r>
-          </a:p>
-          <a:p>
-            <a:pPr lvl="2"/>
-            <a:r>
-              <a:rPr lang="en-US" b="0" i="0" dirty="0">
-                <a:solidFill>
-                  <a:srgbClr val="1C1917"/>
-                </a:solidFill>
-                <a:effectLst/>
-                <a:latin typeface="-apple-system"/>
-              </a:rPr>
-              <a:t>This allows you to lend row level and summary data together</a:t>
-            </a:r>
-            <a:endParaRPr lang="en-US" dirty="0">
-              <a:solidFill>
-                <a:srgbClr val="1C1917"/>
-              </a:solidFill>
-              <a:latin typeface="-apple-system"/>
-            </a:endParaRPr>
-          </a:p>
-          <a:p>
-            <a:pPr marL="1314450" lvl="3" indent="0">
-              <a:buNone/>
-            </a:pPr>
-            <a:endParaRPr lang="en-US" b="0" i="0" dirty="0">
-              <a:solidFill>
-                <a:srgbClr val="1C1917"/>
-              </a:solidFill>
-              <a:effectLst/>
-              <a:latin typeface="-apple-system"/>
-            </a:endParaRPr>
-          </a:p>
-          <a:p>
-            <a:pPr lvl="1">
-              <a:buFont typeface="Arial" panose="020B0604020202020204" pitchFamily="34" charset="0"/>
-              <a:buChar char="•"/>
-            </a:pPr>
-            <a:endParaRPr lang="en-US" b="0" i="0" dirty="0">
-              <a:solidFill>
-                <a:srgbClr val="1C1917"/>
-              </a:solidFill>
-              <a:effectLst/>
-              <a:latin typeface="-apple-system"/>
-            </a:endParaRPr>
-          </a:p>
         </p:txBody>
       </p:sp>
     </p:spTree>
     <p:extLst>
       <p:ext uri="{BB962C8B-B14F-4D97-AF65-F5344CB8AC3E}">
-        <p14:creationId xmlns:p14="http://schemas.microsoft.com/office/powerpoint/2010/main" val="1164140935"/>
+        <p14:creationId xmlns:p14="http://schemas.microsoft.com/office/powerpoint/2010/main" val="646585537"/>
       </p:ext>
     </p:extLst>
   </p:cSld>
@@ -19317,7 +19534,7 @@
           <a:p>
             <a:r>
               <a:rPr lang="en-US" dirty="0"/>
-              <a:t>Joins Enabled Aggregated Analysis</a:t>
+              <a:t>Hands On Examples</a:t>
             </a:r>
           </a:p>
         </p:txBody>
@@ -19348,234 +19565,137 @@
           <a:bodyPr/>
           <a:lstStyle/>
           <a:p>
-            <a:r>
-              <a:rPr lang="en-US" b="0" i="0" dirty="0">
-                <a:solidFill>
-                  <a:srgbClr val="1C1917"/>
-                </a:solidFill>
-                <a:effectLst/>
+            <a:pPr algn="l"/>
+            <a:r>
+              <a:rPr lang="en-US" dirty="0">
+                <a:solidFill>
+                  <a:srgbClr val="24292F"/>
+                </a:solidFill>
                 <a:latin typeface="-apple-system"/>
               </a:rPr>
-              <a:t>SQL Syntax Pattern</a:t>
+              <a:t>U</a:t>
+            </a:r>
+            <a:r>
+              <a:rPr lang="en-US" b="0" i="0" dirty="0">
+                <a:solidFill>
+                  <a:srgbClr val="24292F"/>
+                </a:solidFill>
+                <a:effectLst/>
+                <a:latin typeface="-apple-system"/>
+              </a:rPr>
+              <a:t>sing the AdventureWorks2012 Database</a:t>
             </a:r>
           </a:p>
           <a:p>
             <a:pPr lvl="1"/>
-            <a:endParaRPr lang="en-US" dirty="0">
+            <a:r>
+              <a:rPr lang="en-US" dirty="0">
+                <a:solidFill>
+                  <a:srgbClr val="24292F"/>
+                </a:solidFill>
+                <a:latin typeface="-apple-system"/>
+              </a:rPr>
+              <a:t>Please open up SSMS</a:t>
+            </a:r>
+          </a:p>
+          <a:p>
+            <a:pPr lvl="1"/>
+            <a:r>
+              <a:rPr lang="en-US" b="0" i="0" dirty="0">
+                <a:solidFill>
+                  <a:srgbClr val="24292F"/>
+                </a:solidFill>
+                <a:effectLst/>
+                <a:latin typeface="-apple-system"/>
+              </a:rPr>
+              <a:t>Connect to BISS</a:t>
+            </a:r>
+          </a:p>
+          <a:p>
+            <a:pPr lvl="2"/>
+            <a:r>
+              <a:rPr lang="en-US" b="0" i="0" dirty="0">
+                <a:solidFill>
+                  <a:srgbClr val="24292F"/>
+                </a:solidFill>
+                <a:effectLst/>
+                <a:latin typeface="-apple-system"/>
+              </a:rPr>
+              <a:t>Server = mss-p1-biss-01</a:t>
+            </a:r>
+          </a:p>
+          <a:p>
+            <a:pPr marL="0" indent="0">
+              <a:buNone/>
+            </a:pPr>
+            <a:endParaRPr lang="en-US" b="0" i="0" dirty="0">
               <a:solidFill>
-                <a:srgbClr val="1C1917"/>
-              </a:solidFill>
-              <a:latin typeface="-apple-system"/>
-            </a:endParaRPr>
-          </a:p>
-          <a:p>
-            <a:pPr marL="800100" lvl="2" indent="0">
-              <a:buNone/>
-            </a:pPr>
-            <a:r>
-              <a:rPr lang="en-US" sz="2000" dirty="0">
-                <a:solidFill>
-                  <a:srgbClr val="1C1917"/>
-                </a:solidFill>
-                <a:latin typeface="-apple-system"/>
-              </a:rPr>
-              <a:t>SELECT </a:t>
-            </a:r>
-            <a:r>
-              <a:rPr lang="en-US" sz="2000" dirty="0" err="1">
-                <a:solidFill>
-                  <a:srgbClr val="1C1917"/>
-                </a:solidFill>
-                <a:latin typeface="-apple-system"/>
-              </a:rPr>
-              <a:t>customers.name</a:t>
-            </a:r>
-            <a:r>
-              <a:rPr lang="en-US" sz="2000" dirty="0">
-                <a:solidFill>
-                  <a:srgbClr val="1C1917"/>
-                </a:solidFill>
-                <a:latin typeface="-apple-system"/>
-              </a:rPr>
-              <a:t>, SUM(</a:t>
-            </a:r>
-            <a:r>
-              <a:rPr lang="en-US" sz="2000" dirty="0" err="1">
-                <a:solidFill>
-                  <a:srgbClr val="1C1917"/>
-                </a:solidFill>
-                <a:latin typeface="-apple-system"/>
-              </a:rPr>
-              <a:t>orders.amount</a:t>
-            </a:r>
-            <a:r>
-              <a:rPr lang="en-US" sz="2000" dirty="0">
-                <a:solidFill>
-                  <a:srgbClr val="1C1917"/>
-                </a:solidFill>
-                <a:latin typeface="-apple-system"/>
-              </a:rPr>
-              <a:t>) AS </a:t>
-            </a:r>
-            <a:r>
-              <a:rPr lang="en-US" sz="2000" dirty="0" err="1">
-                <a:solidFill>
-                  <a:srgbClr val="1C1917"/>
-                </a:solidFill>
-                <a:latin typeface="-apple-system"/>
-              </a:rPr>
-              <a:t>total_purchased</a:t>
-            </a:r>
-            <a:endParaRPr lang="en-US" sz="2000" dirty="0">
-              <a:solidFill>
-                <a:srgbClr val="1C1917"/>
-              </a:solidFill>
-              <a:latin typeface="-apple-system"/>
-            </a:endParaRPr>
-          </a:p>
-          <a:p>
-            <a:pPr marL="800100" lvl="2" indent="0">
-              <a:buNone/>
-            </a:pPr>
-            <a:r>
-              <a:rPr lang="en-US" sz="2000" dirty="0">
-                <a:solidFill>
-                  <a:srgbClr val="1C1917"/>
-                </a:solidFill>
-                <a:latin typeface="-apple-system"/>
-              </a:rPr>
-              <a:t>FROM customers</a:t>
-            </a:r>
-          </a:p>
-          <a:p>
-            <a:pPr marL="800100" lvl="2" indent="0">
-              <a:buNone/>
-            </a:pPr>
-            <a:r>
-              <a:rPr lang="en-US" sz="2000" dirty="0">
-                <a:solidFill>
-                  <a:srgbClr val="1C1917"/>
-                </a:solidFill>
-                <a:latin typeface="-apple-system"/>
-              </a:rPr>
-              <a:t>INNER JOIN orders</a:t>
-            </a:r>
-          </a:p>
-          <a:p>
-            <a:pPr marL="800100" lvl="2" indent="0">
-              <a:buNone/>
-            </a:pPr>
-            <a:r>
-              <a:rPr lang="en-US" sz="2000" dirty="0">
-                <a:solidFill>
-                  <a:srgbClr val="1C1917"/>
-                </a:solidFill>
-                <a:latin typeface="-apple-system"/>
-              </a:rPr>
-              <a:t>  ON </a:t>
-            </a:r>
-            <a:r>
-              <a:rPr lang="en-US" sz="2000" dirty="0" err="1">
-                <a:solidFill>
-                  <a:srgbClr val="1C1917"/>
-                </a:solidFill>
-                <a:latin typeface="-apple-system"/>
-              </a:rPr>
-              <a:t>customers.id</a:t>
-            </a:r>
-            <a:r>
-              <a:rPr lang="en-US" sz="2000" dirty="0">
-                <a:solidFill>
-                  <a:srgbClr val="1C1917"/>
-                </a:solidFill>
-                <a:latin typeface="-apple-system"/>
-              </a:rPr>
-              <a:t> = </a:t>
-            </a:r>
-            <a:r>
-              <a:rPr lang="en-US" sz="2000" dirty="0" err="1">
-                <a:solidFill>
-                  <a:srgbClr val="1C1917"/>
-                </a:solidFill>
-                <a:latin typeface="-apple-system"/>
-              </a:rPr>
-              <a:t>orders.customer_id</a:t>
-            </a:r>
-            <a:endParaRPr lang="en-US" sz="2000" dirty="0">
-              <a:solidFill>
-                <a:srgbClr val="1C1917"/>
-              </a:solidFill>
-              <a:latin typeface="-apple-system"/>
-            </a:endParaRPr>
-          </a:p>
-          <a:p>
-            <a:pPr marL="800100" lvl="2" indent="0">
-              <a:buNone/>
-            </a:pPr>
-            <a:r>
-              <a:rPr lang="en-US" sz="2000" dirty="0">
-                <a:solidFill>
-                  <a:srgbClr val="1C1917"/>
-                </a:solidFill>
-                <a:latin typeface="-apple-system"/>
-              </a:rPr>
-              <a:t>GROUP BY </a:t>
-            </a:r>
-            <a:r>
-              <a:rPr lang="en-US" sz="2000" dirty="0" err="1">
-                <a:solidFill>
-                  <a:srgbClr val="1C1917"/>
-                </a:solidFill>
-                <a:latin typeface="-apple-system"/>
-              </a:rPr>
-              <a:t>customers.name</a:t>
-            </a:r>
-            <a:endParaRPr lang="en-US" sz="2000" b="0" i="0" dirty="0">
-              <a:solidFill>
-                <a:srgbClr val="1C1917"/>
+                <a:srgbClr val="24292F"/>
               </a:solidFill>
               <a:effectLst/>
               <a:latin typeface="-apple-system"/>
             </a:endParaRPr>
           </a:p>
           <a:p>
-            <a:pPr lvl="1"/>
-            <a:endParaRPr lang="en-US" sz="2400" b="0" i="0" dirty="0">
+            <a:pPr marL="0" indent="0" algn="l">
+              <a:buNone/>
+            </a:pPr>
+            <a:endParaRPr lang="en-US" b="0" i="0" dirty="0">
               <a:solidFill>
-                <a:srgbClr val="1C1917"/>
+                <a:srgbClr val="24292F"/>
               </a:solidFill>
               <a:effectLst/>
               <a:latin typeface="-apple-system"/>
             </a:endParaRPr>
           </a:p>
           <a:p>
+            <a:pPr marL="0" indent="0" algn="l">
+              <a:buNone/>
+            </a:pPr>
             <a:endParaRPr lang="en-US" b="0" i="0" dirty="0">
               <a:solidFill>
-                <a:srgbClr val="1C1917"/>
+                <a:srgbClr val="24292F"/>
               </a:solidFill>
               <a:effectLst/>
               <a:latin typeface="-apple-system"/>
             </a:endParaRPr>
           </a:p>
-          <a:p>
-            <a:pPr lvl="1">
-              <a:buFont typeface="Arial" panose="020B0604020202020204" pitchFamily="34" charset="0"/>
-              <a:buChar char="•"/>
-            </a:pPr>
-            <a:endParaRPr lang="en-US" b="0" i="0" dirty="0">
-              <a:solidFill>
-                <a:srgbClr val="1C1917"/>
-              </a:solidFill>
-              <a:effectLst/>
-              <a:latin typeface="-apple-system"/>
-            </a:endParaRPr>
-          </a:p>
         </p:txBody>
       </p:sp>
+      <p:pic>
+        <p:nvPicPr>
+          <p:cNvPr id="2" name="Picture 1">
+            <a:extLst>
+              <a:ext uri="{FF2B5EF4-FFF2-40B4-BE49-F238E27FC236}">
+                <a16:creationId xmlns:a16="http://schemas.microsoft.com/office/drawing/2014/main" id="{7C73B60A-9D72-9725-CF53-6F536A38C53C}"/>
+              </a:ext>
+            </a:extLst>
+          </p:cNvPr>
+          <p:cNvPicPr>
+            <a:picLocks noChangeAspect="1"/>
+          </p:cNvPicPr>
+          <p:nvPr/>
+        </p:nvPicPr>
+        <p:blipFill>
+          <a:blip r:embed="rId2"/>
+          <a:stretch>
+            <a:fillRect/>
+          </a:stretch>
+        </p:blipFill>
+        <p:spPr>
+          <a:xfrm>
+            <a:off x="1808367" y="2943224"/>
+            <a:ext cx="4808896" cy="3171825"/>
+          </a:xfrm>
+          <a:prstGeom prst="rect">
+            <a:avLst/>
+          </a:prstGeom>
+        </p:spPr>
+      </p:pic>
     </p:spTree>
     <p:extLst>
       <p:ext uri="{BB962C8B-B14F-4D97-AF65-F5344CB8AC3E}">
-        <p14:creationId xmlns:p14="http://schemas.microsoft.com/office/powerpoint/2010/main" val="1661331824"/>
+        <p14:creationId xmlns:p14="http://schemas.microsoft.com/office/powerpoint/2010/main" val="146600374"/>
       </p:ext>
     </p:extLst>
   </p:cSld>
@@ -19832,7 +19952,7 @@
           <a:p>
             <a:r>
               <a:rPr lang="en-US" dirty="0"/>
-              <a:t>Joins Enabled Aggregated Analysis</a:t>
+              <a:t>Hands On Examples</a:t>
             </a:r>
           </a:p>
         </p:txBody>
@@ -19866,393 +19986,105 @@
             <a:r>
               <a:rPr lang="en-US" b="0" i="0" dirty="0">
                 <a:solidFill>
-                  <a:srgbClr val="1C1917"/>
+                  <a:srgbClr val="24292F"/>
                 </a:solidFill>
                 <a:effectLst/>
                 <a:latin typeface="-apple-system"/>
               </a:rPr>
-              <a:t>Join a customers table to an orders table</a:t>
-            </a:r>
-          </a:p>
-          <a:p>
-            <a:pPr marL="914400" lvl="2" indent="0">
-              <a:buNone/>
-            </a:pPr>
-            <a:r>
-              <a:rPr lang="en-US" b="0" i="0" dirty="0">
-                <a:solidFill>
-                  <a:srgbClr val="1C1917"/>
-                </a:solidFill>
-                <a:effectLst/>
-                <a:latin typeface="-apple-system"/>
-              </a:rPr>
-              <a:t>SELECT </a:t>
-            </a:r>
-            <a:r>
-              <a:rPr lang="en-US" b="0" i="0" dirty="0" err="1">
-                <a:solidFill>
-                  <a:srgbClr val="1C1917"/>
-                </a:solidFill>
-                <a:effectLst/>
-                <a:latin typeface="-apple-system"/>
-              </a:rPr>
-              <a:t>c.name</a:t>
-            </a:r>
-            <a:r>
-              <a:rPr lang="en-US" b="0" i="0" dirty="0">
-                <a:solidFill>
-                  <a:srgbClr val="1C1917"/>
-                </a:solidFill>
-                <a:effectLst/>
-                <a:latin typeface="-apple-system"/>
-              </a:rPr>
-              <a:t>, </a:t>
-            </a:r>
-            <a:r>
-              <a:rPr lang="en-US" b="0" i="0" dirty="0" err="1">
-                <a:solidFill>
-                  <a:srgbClr val="1C1917"/>
-                </a:solidFill>
-                <a:effectLst/>
-                <a:latin typeface="-apple-system"/>
-              </a:rPr>
-              <a:t>o.amount</a:t>
-            </a:r>
-            <a:r>
-              <a:rPr lang="en-US" b="0" i="0" dirty="0">
-                <a:solidFill>
-                  <a:srgbClr val="1C1917"/>
-                </a:solidFill>
-                <a:effectLst/>
-                <a:latin typeface="-apple-system"/>
-              </a:rPr>
-              <a:t> </a:t>
-            </a:r>
-          </a:p>
-          <a:p>
-            <a:pPr marL="914400" lvl="2" indent="0">
-              <a:buNone/>
-            </a:pPr>
-            <a:r>
-              <a:rPr lang="en-US" b="0" i="0" dirty="0">
-                <a:solidFill>
-                  <a:srgbClr val="1C1917"/>
-                </a:solidFill>
-                <a:effectLst/>
-                <a:latin typeface="-apple-system"/>
-              </a:rPr>
-              <a:t>FROM customers c</a:t>
-            </a:r>
-          </a:p>
-          <a:p>
-            <a:pPr marL="914400" lvl="2" indent="0">
-              <a:buNone/>
-            </a:pPr>
-            <a:r>
-              <a:rPr lang="en-US" b="0" i="0" dirty="0">
-                <a:solidFill>
-                  <a:srgbClr val="1C1917"/>
-                </a:solidFill>
-                <a:effectLst/>
-                <a:latin typeface="-apple-system"/>
-              </a:rPr>
-              <a:t>JOIN orders o </a:t>
-            </a:r>
-          </a:p>
-          <a:p>
-            <a:pPr marL="914400" lvl="2" indent="0">
-              <a:buNone/>
-            </a:pPr>
-            <a:r>
-              <a:rPr lang="en-US" dirty="0">
-                <a:solidFill>
-                  <a:srgbClr val="1C1917"/>
-                </a:solidFill>
-                <a:latin typeface="-apple-system"/>
-              </a:rPr>
-              <a:t>  </a:t>
-            </a:r>
-            <a:r>
-              <a:rPr lang="en-US" b="0" i="0" dirty="0">
-                <a:solidFill>
-                  <a:srgbClr val="1C1917"/>
-                </a:solidFill>
-                <a:effectLst/>
-                <a:latin typeface="-apple-system"/>
-              </a:rPr>
-              <a:t>ON </a:t>
-            </a:r>
-            <a:r>
-              <a:rPr lang="en-US" b="0" i="0" dirty="0" err="1">
-                <a:solidFill>
-                  <a:srgbClr val="1C1917"/>
-                </a:solidFill>
-                <a:effectLst/>
-                <a:latin typeface="-apple-system"/>
-              </a:rPr>
-              <a:t>c.id</a:t>
-            </a:r>
-            <a:r>
-              <a:rPr lang="en-US" b="0" i="0" dirty="0">
-                <a:solidFill>
-                  <a:srgbClr val="1C1917"/>
-                </a:solidFill>
-                <a:effectLst/>
-                <a:latin typeface="-apple-system"/>
-              </a:rPr>
-              <a:t> = </a:t>
-            </a:r>
-            <a:r>
-              <a:rPr lang="en-US" b="0" i="0" dirty="0" err="1">
-                <a:solidFill>
-                  <a:srgbClr val="1C1917"/>
-                </a:solidFill>
-                <a:effectLst/>
-                <a:latin typeface="-apple-system"/>
-              </a:rPr>
-              <a:t>o.customer_id</a:t>
-            </a:r>
+              <a:t>Click File -&gt; Open -&gt; File</a:t>
+            </a:r>
+          </a:p>
+          <a:p>
             <a:endParaRPr lang="en-US" b="0" i="0" dirty="0">
               <a:solidFill>
-                <a:srgbClr val="1C1917"/>
+                <a:srgbClr val="24292F"/>
               </a:solidFill>
               <a:effectLst/>
               <a:latin typeface="-apple-system"/>
             </a:endParaRPr>
           </a:p>
           <a:p>
-            <a:pPr marL="514350" lvl="1" indent="0">
-              <a:buNone/>
-            </a:pPr>
+            <a:pPr lvl="1"/>
             <a:endParaRPr lang="en-US" b="0" i="0" dirty="0">
               <a:solidFill>
-                <a:srgbClr val="1C1917"/>
+                <a:srgbClr val="24292F"/>
               </a:solidFill>
               <a:effectLst/>
               <a:latin typeface="-apple-system"/>
             </a:endParaRPr>
           </a:p>
           <a:p>
-            <a:r>
-              <a:rPr lang="en-US" b="0" i="0" dirty="0">
-                <a:solidFill>
-                  <a:srgbClr val="1C1917"/>
-                </a:solidFill>
-                <a:effectLst/>
-                <a:latin typeface="-apple-system"/>
-              </a:rPr>
-              <a:t>Then, aggregate the joined data</a:t>
-            </a:r>
-          </a:p>
-          <a:p>
-            <a:pPr marL="857250" lvl="2" indent="0">
-              <a:buNone/>
-            </a:pPr>
-            <a:r>
-              <a:rPr lang="en-US" b="0" i="0" dirty="0">
-                <a:solidFill>
-                  <a:srgbClr val="1C1917"/>
-                </a:solidFill>
-                <a:effectLst/>
-                <a:latin typeface="-apple-system"/>
-              </a:rPr>
-              <a:t>SELECT </a:t>
-            </a:r>
-            <a:r>
-              <a:rPr lang="en-US" b="0" i="0" dirty="0" err="1">
-                <a:solidFill>
-                  <a:srgbClr val="1C1917"/>
-                </a:solidFill>
-                <a:effectLst/>
-                <a:latin typeface="-apple-system"/>
-              </a:rPr>
-              <a:t>c.name</a:t>
-            </a:r>
-            <a:r>
-              <a:rPr lang="en-US" b="0" i="0" dirty="0">
-                <a:solidFill>
-                  <a:srgbClr val="1C1917"/>
-                </a:solidFill>
-                <a:effectLst/>
-                <a:latin typeface="-apple-system"/>
-              </a:rPr>
-              <a:t>, SUM(</a:t>
-            </a:r>
-            <a:r>
-              <a:rPr lang="en-US" b="0" i="0" dirty="0" err="1">
-                <a:solidFill>
-                  <a:srgbClr val="1C1917"/>
-                </a:solidFill>
-                <a:effectLst/>
-                <a:latin typeface="-apple-system"/>
-              </a:rPr>
-              <a:t>o.amount</a:t>
-            </a:r>
-            <a:r>
-              <a:rPr lang="en-US" b="0" i="0" dirty="0">
-                <a:solidFill>
-                  <a:srgbClr val="1C1917"/>
-                </a:solidFill>
-                <a:effectLst/>
-                <a:latin typeface="-apple-system"/>
-              </a:rPr>
-              <a:t>) </a:t>
-            </a:r>
-          </a:p>
-          <a:p>
-            <a:pPr marL="857250" lvl="2" indent="0">
-              <a:buNone/>
-            </a:pPr>
-            <a:r>
-              <a:rPr lang="en-US" b="0" i="0" dirty="0">
-                <a:solidFill>
-                  <a:srgbClr val="1C1917"/>
-                </a:solidFill>
-                <a:effectLst/>
-                <a:latin typeface="-apple-system"/>
-              </a:rPr>
-              <a:t>FROM customers c  </a:t>
-            </a:r>
-          </a:p>
-          <a:p>
-            <a:pPr marL="857250" lvl="2" indent="0">
-              <a:buNone/>
-            </a:pPr>
-            <a:r>
-              <a:rPr lang="en-US" b="0" i="0" dirty="0">
-                <a:solidFill>
-                  <a:srgbClr val="1C1917"/>
-                </a:solidFill>
-                <a:effectLst/>
-                <a:latin typeface="-apple-system"/>
-              </a:rPr>
-              <a:t>JOIN orders o </a:t>
-            </a:r>
-          </a:p>
-          <a:p>
-            <a:pPr marL="857250" lvl="2" indent="0">
-              <a:buNone/>
-            </a:pPr>
-            <a:r>
-              <a:rPr lang="en-US" dirty="0">
-                <a:solidFill>
-                  <a:srgbClr val="1C1917"/>
-                </a:solidFill>
-                <a:latin typeface="-apple-system"/>
-              </a:rPr>
-              <a:t>  </a:t>
-            </a:r>
-            <a:r>
-              <a:rPr lang="en-US" b="0" i="0" dirty="0">
-                <a:solidFill>
-                  <a:srgbClr val="1C1917"/>
-                </a:solidFill>
-                <a:effectLst/>
-                <a:latin typeface="-apple-system"/>
-              </a:rPr>
-              <a:t>ON </a:t>
-            </a:r>
-            <a:r>
-              <a:rPr lang="en-US" b="0" i="0" dirty="0" err="1">
-                <a:solidFill>
-                  <a:srgbClr val="1C1917"/>
-                </a:solidFill>
-                <a:effectLst/>
-                <a:latin typeface="-apple-system"/>
-              </a:rPr>
-              <a:t>c.id</a:t>
-            </a:r>
-            <a:r>
-              <a:rPr lang="en-US" b="0" i="0" dirty="0">
-                <a:solidFill>
-                  <a:srgbClr val="1C1917"/>
-                </a:solidFill>
-                <a:effectLst/>
-                <a:latin typeface="-apple-system"/>
-              </a:rPr>
-              <a:t> = </a:t>
-            </a:r>
-            <a:r>
-              <a:rPr lang="en-US" b="0" i="0" dirty="0" err="1">
-                <a:solidFill>
-                  <a:srgbClr val="1C1917"/>
-                </a:solidFill>
-                <a:effectLst/>
-                <a:latin typeface="-apple-system"/>
-              </a:rPr>
-              <a:t>o.customer_id</a:t>
-            </a:r>
+            <a:pPr marL="0" indent="0">
+              <a:buNone/>
+            </a:pPr>
             <a:endParaRPr lang="en-US" b="0" i="0" dirty="0">
               <a:solidFill>
-                <a:srgbClr val="1C1917"/>
+                <a:srgbClr val="24292F"/>
               </a:solidFill>
               <a:effectLst/>
               <a:latin typeface="-apple-system"/>
             </a:endParaRPr>
           </a:p>
           <a:p>
-            <a:pPr marL="857250" lvl="2" indent="0">
-              <a:buNone/>
-            </a:pPr>
-            <a:r>
-              <a:rPr lang="en-US" b="0" i="0" dirty="0">
-                <a:solidFill>
-                  <a:srgbClr val="1C1917"/>
-                </a:solidFill>
-                <a:effectLst/>
-                <a:latin typeface="-apple-system"/>
-              </a:rPr>
-              <a:t>GROUP BY </a:t>
-            </a:r>
-            <a:r>
-              <a:rPr lang="en-US" b="0" i="0" dirty="0" err="1">
-                <a:solidFill>
-                  <a:srgbClr val="1C1917"/>
-                </a:solidFill>
-                <a:effectLst/>
-                <a:latin typeface="-apple-system"/>
-              </a:rPr>
-              <a:t>c.name</a:t>
-            </a:r>
+            <a:pPr marL="0" indent="0" algn="l">
+              <a:buNone/>
+            </a:pPr>
             <a:endParaRPr lang="en-US" b="0" i="0" dirty="0">
               <a:solidFill>
-                <a:srgbClr val="1C1917"/>
+                <a:srgbClr val="24292F"/>
               </a:solidFill>
               <a:effectLst/>
               <a:latin typeface="-apple-system"/>
             </a:endParaRPr>
           </a:p>
           <a:p>
-            <a:pPr marL="1771650" lvl="4" indent="0">
+            <a:pPr marL="0" indent="0" algn="l">
               <a:buNone/>
             </a:pPr>
             <a:endParaRPr lang="en-US" b="0" i="0" dirty="0">
               <a:solidFill>
-                <a:srgbClr val="1C1917"/>
+                <a:srgbClr val="24292F"/>
               </a:solidFill>
               <a:effectLst/>
               <a:latin typeface="-apple-system"/>
             </a:endParaRPr>
           </a:p>
-          <a:p>
-            <a:pPr lvl="1">
-              <a:buFont typeface="Arial" panose="020B0604020202020204" pitchFamily="34" charset="0"/>
-              <a:buChar char="•"/>
-            </a:pPr>
-            <a:endParaRPr lang="en-US" b="0" i="0" dirty="0">
-              <a:solidFill>
-                <a:srgbClr val="1C1917"/>
-              </a:solidFill>
-              <a:effectLst/>
-              <a:latin typeface="-apple-system"/>
-            </a:endParaRPr>
-          </a:p>
         </p:txBody>
       </p:sp>
+      <p:pic>
+        <p:nvPicPr>
+          <p:cNvPr id="4" name="Picture 3">
+            <a:extLst>
+              <a:ext uri="{FF2B5EF4-FFF2-40B4-BE49-F238E27FC236}">
+                <a16:creationId xmlns:a16="http://schemas.microsoft.com/office/drawing/2014/main" id="{9913EA44-DE34-7A79-B7FD-95E417CE2AD5}"/>
+              </a:ext>
+            </a:extLst>
+          </p:cNvPr>
+          <p:cNvPicPr>
+            <a:picLocks noChangeAspect="1"/>
+          </p:cNvPicPr>
+          <p:nvPr/>
+        </p:nvPicPr>
+        <p:blipFill>
+          <a:blip r:embed="rId2"/>
+          <a:stretch>
+            <a:fillRect/>
+          </a:stretch>
+        </p:blipFill>
+        <p:spPr>
+          <a:xfrm>
+            <a:off x="1363762" y="2084652"/>
+            <a:ext cx="6193146" cy="3605436"/>
+          </a:xfrm>
+          <a:prstGeom prst="rect">
+            <a:avLst/>
+          </a:prstGeom>
+        </p:spPr>
+      </p:pic>
     </p:spTree>
     <p:extLst>
       <p:ext uri="{BB962C8B-B14F-4D97-AF65-F5344CB8AC3E}">
-        <p14:creationId xmlns:p14="http://schemas.microsoft.com/office/powerpoint/2010/main" val="3835619614"/>
+        <p14:creationId xmlns:p14="http://schemas.microsoft.com/office/powerpoint/2010/main" val="1451264872"/>
       </p:ext>
     </p:extLst>
   </p:cSld>
@@ -20509,7 +20341,7 @@
           <a:p>
             <a:r>
               <a:rPr lang="en-US" dirty="0"/>
-              <a:t>Joins Enabled Aggregated Analysis</a:t>
+              <a:t>Hands On Examples</a:t>
             </a:r>
           </a:p>
         </p:txBody>
@@ -20540,346 +20372,176 @@
           <a:bodyPr/>
           <a:lstStyle/>
           <a:p>
-            <a:pPr algn="l"/>
-            <a:r>
-              <a:rPr lang="en-US" b="0" i="0" dirty="0">
-                <a:solidFill>
-                  <a:srgbClr val="1C1917"/>
+            <a:r>
+              <a:rPr lang="en-US" b="0" i="0" dirty="0">
+                <a:solidFill>
+                  <a:srgbClr val="24292F"/>
                 </a:solidFill>
                 <a:effectLst/>
                 <a:latin typeface="-apple-system"/>
               </a:rPr>
-              <a:t>Examples Using AdventerWorks2012:</a:t>
-            </a:r>
-          </a:p>
-          <a:p>
-            <a:pPr algn="l"/>
+              <a:t>Open the SQL Day </a:t>
+            </a:r>
+            <a:r>
+              <a:rPr lang="en-US" dirty="0">
+                <a:solidFill>
+                  <a:srgbClr val="24292F"/>
+                </a:solidFill>
+                <a:latin typeface="-apple-system"/>
+              </a:rPr>
+              <a:t>4</a:t>
+            </a:r>
+            <a:r>
+              <a:rPr lang="en-US" b="0" i="0" dirty="0">
+                <a:solidFill>
+                  <a:srgbClr val="24292F"/>
+                </a:solidFill>
+                <a:effectLst/>
+                <a:latin typeface="-apple-system"/>
+              </a:rPr>
+              <a:t> Joins Guided </a:t>
+            </a:r>
+            <a:r>
+              <a:rPr lang="en-US" b="0" i="0" dirty="0" err="1">
+                <a:solidFill>
+                  <a:srgbClr val="24292F"/>
+                </a:solidFill>
+                <a:effectLst/>
+                <a:latin typeface="-apple-system"/>
+              </a:rPr>
+              <a:t>Script.sql</a:t>
+            </a:r>
+            <a:r>
+              <a:rPr lang="en-US" b="0" i="0" dirty="0">
+                <a:solidFill>
+                  <a:srgbClr val="24292F"/>
+                </a:solidFill>
+                <a:effectLst/>
+                <a:latin typeface="-apple-system"/>
+              </a:rPr>
+              <a:t> file </a:t>
+            </a:r>
+          </a:p>
+          <a:p>
+            <a:pPr marL="0" indent="0">
+              <a:buNone/>
+            </a:pPr>
+            <a:endParaRPr lang="en-US" dirty="0">
+              <a:solidFill>
+                <a:srgbClr val="24292F"/>
+              </a:solidFill>
+              <a:latin typeface="-apple-system"/>
+            </a:endParaRPr>
+          </a:p>
+          <a:p>
             <a:endParaRPr lang="en-US" b="0" i="0" dirty="0">
               <a:solidFill>
-                <a:srgbClr val="1C1917"/>
+                <a:srgbClr val="24292F"/>
               </a:solidFill>
               <a:effectLst/>
               <a:latin typeface="-apple-system"/>
             </a:endParaRPr>
           </a:p>
           <a:p>
-            <a:pPr lvl="1"/>
-            <a:r>
-              <a:rPr lang="en-US" i="0" dirty="0">
-                <a:solidFill>
-                  <a:srgbClr val="1C1917"/>
-                </a:solidFill>
-                <a:effectLst/>
-                <a:latin typeface="-apple-system"/>
-              </a:rPr>
-              <a:t>Average reseller sales amount per year:</a:t>
-            </a:r>
-          </a:p>
-          <a:p>
-            <a:pPr lvl="1"/>
-            <a:endParaRPr lang="en-US" i="0" dirty="0">
+            <a:endParaRPr lang="en-US" b="0" i="0" dirty="0">
               <a:solidFill>
-                <a:srgbClr val="1C1917"/>
+                <a:srgbClr val="24292F"/>
               </a:solidFill>
               <a:effectLst/>
               <a:latin typeface="-apple-system"/>
             </a:endParaRPr>
           </a:p>
           <a:p>
-            <a:pPr marL="857250" lvl="2" indent="0">
-              <a:buNone/>
-            </a:pPr>
-            <a:r>
-              <a:rPr lang="en-US" i="0" dirty="0">
-                <a:solidFill>
-                  <a:srgbClr val="1C1917"/>
-                </a:solidFill>
-                <a:effectLst/>
-                <a:latin typeface="-apple-system"/>
-              </a:rPr>
-              <a:t>SELECT YEAR(</a:t>
-            </a:r>
-            <a:r>
-              <a:rPr lang="en-US" i="0" dirty="0" err="1">
-                <a:solidFill>
-                  <a:srgbClr val="1C1917"/>
-                </a:solidFill>
-                <a:effectLst/>
-                <a:latin typeface="-apple-system"/>
-              </a:rPr>
-              <a:t>sh.OrderDate</a:t>
-            </a:r>
-            <a:r>
-              <a:rPr lang="en-US" i="0" dirty="0">
-                <a:solidFill>
-                  <a:srgbClr val="1C1917"/>
-                </a:solidFill>
-                <a:effectLst/>
-                <a:latin typeface="-apple-system"/>
-              </a:rPr>
-              <a:t>) AS </a:t>
-            </a:r>
-            <a:r>
-              <a:rPr lang="en-US" i="0" dirty="0" err="1">
-                <a:solidFill>
-                  <a:srgbClr val="1C1917"/>
-                </a:solidFill>
-                <a:effectLst/>
-                <a:latin typeface="-apple-system"/>
-              </a:rPr>
-              <a:t>OrderYear</a:t>
-            </a:r>
-            <a:r>
-              <a:rPr lang="en-US" i="0" dirty="0">
-                <a:solidFill>
-                  <a:srgbClr val="1C1917"/>
-                </a:solidFill>
-                <a:effectLst/>
-                <a:latin typeface="-apple-system"/>
-              </a:rPr>
-              <a:t>, AVG(</a:t>
-            </a:r>
-            <a:r>
-              <a:rPr lang="en-US" i="0" dirty="0" err="1">
-                <a:solidFill>
-                  <a:srgbClr val="1C1917"/>
-                </a:solidFill>
-                <a:effectLst/>
-                <a:latin typeface="-apple-system"/>
-              </a:rPr>
-              <a:t>sd.LineTotal</a:t>
-            </a:r>
-            <a:r>
-              <a:rPr lang="en-US" i="0" dirty="0">
-                <a:solidFill>
-                  <a:srgbClr val="1C1917"/>
-                </a:solidFill>
-                <a:effectLst/>
-                <a:latin typeface="-apple-system"/>
-              </a:rPr>
-              <a:t>) AS </a:t>
-            </a:r>
-            <a:r>
-              <a:rPr lang="en-US" i="0" dirty="0" err="1">
-                <a:solidFill>
-                  <a:srgbClr val="1C1917"/>
-                </a:solidFill>
-                <a:effectLst/>
-                <a:latin typeface="-apple-system"/>
-              </a:rPr>
-              <a:t>AverageSales</a:t>
-            </a:r>
-            <a:endParaRPr lang="en-US" i="0" dirty="0">
+            <a:endParaRPr lang="en-US" b="0" i="0" dirty="0">
               <a:solidFill>
-                <a:srgbClr val="1C1917"/>
+                <a:srgbClr val="24292F"/>
               </a:solidFill>
               <a:effectLst/>
               <a:latin typeface="-apple-system"/>
             </a:endParaRPr>
           </a:p>
           <a:p>
-            <a:pPr marL="857250" lvl="2" indent="0">
-              <a:buNone/>
-            </a:pPr>
-            <a:r>
-              <a:rPr lang="en-US" i="0" dirty="0">
-                <a:solidFill>
-                  <a:srgbClr val="1C1917"/>
-                </a:solidFill>
-                <a:effectLst/>
-                <a:latin typeface="-apple-system"/>
-              </a:rPr>
-              <a:t>FROM </a:t>
-            </a:r>
-            <a:r>
-              <a:rPr lang="en-US" i="0" dirty="0" err="1">
-                <a:solidFill>
-                  <a:srgbClr val="1C1917"/>
-                </a:solidFill>
-                <a:effectLst/>
-                <a:latin typeface="-apple-system"/>
-              </a:rPr>
-              <a:t>Sales.SalesOrderHeader</a:t>
-            </a:r>
-            <a:r>
-              <a:rPr lang="en-US" i="0" dirty="0">
-                <a:solidFill>
-                  <a:srgbClr val="1C1917"/>
-                </a:solidFill>
-                <a:effectLst/>
-                <a:latin typeface="-apple-system"/>
-              </a:rPr>
-              <a:t> </a:t>
-            </a:r>
-            <a:r>
-              <a:rPr lang="en-US" i="0" dirty="0" err="1">
-                <a:solidFill>
-                  <a:srgbClr val="1C1917"/>
-                </a:solidFill>
-                <a:effectLst/>
-                <a:latin typeface="-apple-system"/>
-              </a:rPr>
-              <a:t>sh</a:t>
-            </a:r>
-            <a:r>
-              <a:rPr lang="en-US" i="0" dirty="0">
-                <a:solidFill>
-                  <a:srgbClr val="1C1917"/>
-                </a:solidFill>
-                <a:effectLst/>
-                <a:latin typeface="-apple-system"/>
-              </a:rPr>
-              <a:t> </a:t>
-            </a:r>
-          </a:p>
-          <a:p>
-            <a:pPr marL="857250" lvl="2" indent="0">
-              <a:buNone/>
-            </a:pPr>
-            <a:r>
-              <a:rPr lang="en-US" i="0" dirty="0">
-                <a:solidFill>
-                  <a:srgbClr val="1C1917"/>
-                </a:solidFill>
-                <a:effectLst/>
-                <a:latin typeface="-apple-system"/>
-              </a:rPr>
-              <a:t>INNER JOIN </a:t>
-            </a:r>
-            <a:r>
-              <a:rPr lang="en-US" i="0" dirty="0" err="1">
-                <a:solidFill>
-                  <a:srgbClr val="1C1917"/>
-                </a:solidFill>
-                <a:effectLst/>
-                <a:latin typeface="-apple-system"/>
-              </a:rPr>
-              <a:t>Sales.SalesOrderDetail</a:t>
-            </a:r>
-            <a:r>
-              <a:rPr lang="en-US" i="0" dirty="0">
-                <a:solidFill>
-                  <a:srgbClr val="1C1917"/>
-                </a:solidFill>
-                <a:effectLst/>
-                <a:latin typeface="-apple-system"/>
-              </a:rPr>
-              <a:t> </a:t>
-            </a:r>
-            <a:r>
-              <a:rPr lang="en-US" i="0" dirty="0" err="1">
-                <a:solidFill>
-                  <a:srgbClr val="1C1917"/>
-                </a:solidFill>
-                <a:effectLst/>
-                <a:latin typeface="-apple-system"/>
-              </a:rPr>
-              <a:t>sd</a:t>
-            </a:r>
-            <a:endParaRPr lang="en-US" i="0" dirty="0">
+            <a:pPr lvl="1"/>
+            <a:endParaRPr lang="en-US" b="0" i="0" dirty="0">
               <a:solidFill>
-                <a:srgbClr val="1C1917"/>
+                <a:srgbClr val="24292F"/>
               </a:solidFill>
               <a:effectLst/>
               <a:latin typeface="-apple-system"/>
             </a:endParaRPr>
           </a:p>
           <a:p>
-            <a:pPr marL="857250" lvl="2" indent="0">
-              <a:buNone/>
-            </a:pPr>
-            <a:r>
-              <a:rPr lang="en-US" i="0" dirty="0">
-                <a:solidFill>
-                  <a:srgbClr val="1C1917"/>
-                </a:solidFill>
-                <a:effectLst/>
-                <a:latin typeface="-apple-system"/>
-              </a:rPr>
-              <a:t>  ON </a:t>
-            </a:r>
-            <a:r>
-              <a:rPr lang="en-US" i="0" dirty="0" err="1">
-                <a:solidFill>
-                  <a:srgbClr val="1C1917"/>
-                </a:solidFill>
-                <a:effectLst/>
-                <a:latin typeface="-apple-system"/>
-              </a:rPr>
-              <a:t>sh.SalesOrderID</a:t>
-            </a:r>
-            <a:r>
-              <a:rPr lang="en-US" i="0" dirty="0">
-                <a:solidFill>
-                  <a:srgbClr val="1C1917"/>
-                </a:solidFill>
-                <a:effectLst/>
-                <a:latin typeface="-apple-system"/>
-              </a:rPr>
-              <a:t> = </a:t>
-            </a:r>
-            <a:r>
-              <a:rPr lang="en-US" i="0" dirty="0" err="1">
-                <a:solidFill>
-                  <a:srgbClr val="1C1917"/>
-                </a:solidFill>
-                <a:effectLst/>
-                <a:latin typeface="-apple-system"/>
-              </a:rPr>
-              <a:t>sd.SalesOrderID</a:t>
-            </a:r>
-            <a:r>
-              <a:rPr lang="en-US" i="0" dirty="0">
-                <a:solidFill>
-                  <a:srgbClr val="1C1917"/>
-                </a:solidFill>
-                <a:effectLst/>
-                <a:latin typeface="-apple-system"/>
-              </a:rPr>
-              <a:t> </a:t>
-            </a:r>
-          </a:p>
-          <a:p>
-            <a:pPr marL="857250" lvl="2" indent="0">
-              <a:buNone/>
-            </a:pPr>
-            <a:r>
-              <a:rPr lang="en-US" i="0" dirty="0">
-                <a:solidFill>
-                  <a:srgbClr val="1C1917"/>
-                </a:solidFill>
-                <a:effectLst/>
-                <a:latin typeface="-apple-system"/>
-              </a:rPr>
-              <a:t>GROUP BY YEAR(</a:t>
-            </a:r>
-            <a:r>
-              <a:rPr lang="en-US" i="0" dirty="0" err="1">
-                <a:solidFill>
-                  <a:srgbClr val="1C1917"/>
-                </a:solidFill>
-                <a:effectLst/>
-                <a:latin typeface="-apple-system"/>
-              </a:rPr>
-              <a:t>sh.OrderDate</a:t>
-            </a:r>
-            <a:r>
-              <a:rPr lang="en-US" i="0" dirty="0">
-                <a:solidFill>
-                  <a:srgbClr val="1C1917"/>
-                </a:solidFill>
-                <a:effectLst/>
-                <a:latin typeface="-apple-system"/>
-              </a:rPr>
-              <a:t>)</a:t>
-            </a:r>
+            <a:pPr marL="0" indent="0">
+              <a:buNone/>
+            </a:pPr>
+            <a:endParaRPr lang="en-US" b="0" i="0" dirty="0">
+              <a:solidFill>
+                <a:srgbClr val="24292F"/>
+              </a:solidFill>
+              <a:effectLst/>
+              <a:latin typeface="-apple-system"/>
+            </a:endParaRPr>
+          </a:p>
+          <a:p>
+            <a:pPr marL="0" indent="0" algn="l">
+              <a:buNone/>
+            </a:pPr>
+            <a:endParaRPr lang="en-US" b="0" i="0" dirty="0">
+              <a:solidFill>
+                <a:srgbClr val="24292F"/>
+              </a:solidFill>
+              <a:effectLst/>
+              <a:latin typeface="-apple-system"/>
+            </a:endParaRPr>
+          </a:p>
+          <a:p>
+            <a:pPr marL="0" indent="0" algn="l">
+              <a:buNone/>
+            </a:pPr>
+            <a:endParaRPr lang="en-US" b="0" i="0" dirty="0">
+              <a:solidFill>
+                <a:srgbClr val="24292F"/>
+              </a:solidFill>
+              <a:effectLst/>
+              <a:latin typeface="-apple-system"/>
+            </a:endParaRPr>
           </a:p>
         </p:txBody>
       </p:sp>
+      <p:pic>
+        <p:nvPicPr>
+          <p:cNvPr id="2" name="Picture 1">
+            <a:extLst>
+              <a:ext uri="{FF2B5EF4-FFF2-40B4-BE49-F238E27FC236}">
+                <a16:creationId xmlns:a16="http://schemas.microsoft.com/office/drawing/2014/main" id="{203BF16A-2184-581B-0E28-4ED81CBB612F}"/>
+              </a:ext>
+            </a:extLst>
+          </p:cNvPr>
+          <p:cNvPicPr>
+            <a:picLocks noChangeAspect="1"/>
+          </p:cNvPicPr>
+          <p:nvPr/>
+        </p:nvPicPr>
+        <p:blipFill>
+          <a:blip r:embed="rId3"/>
+          <a:stretch>
+            <a:fillRect/>
+          </a:stretch>
+        </p:blipFill>
+        <p:spPr>
+          <a:xfrm>
+            <a:off x="1699622" y="2073393"/>
+            <a:ext cx="4557713" cy="3066569"/>
+          </a:xfrm>
+          <a:prstGeom prst="rect">
+            <a:avLst/>
+          </a:prstGeom>
+        </p:spPr>
+      </p:pic>
     </p:spTree>
     <p:extLst>
       <p:ext uri="{BB962C8B-B14F-4D97-AF65-F5344CB8AC3E}">
-        <p14:creationId xmlns:p14="http://schemas.microsoft.com/office/powerpoint/2010/main" val="4133908408"/>
+        <p14:creationId xmlns:p14="http://schemas.microsoft.com/office/powerpoint/2010/main" val="1833757041"/>
       </p:ext>
     </p:extLst>
   </p:cSld>
@@ -21516,7 +21178,7 @@
           <a:p>
             <a:r>
               <a:rPr lang="en-US" dirty="0"/>
-              <a:t>Hands On Examples</a:t>
+              <a:t>Summary</a:t>
             </a:r>
           </a:p>
         </p:txBody>
@@ -21547,1270 +21209,6 @@
           <a:bodyPr/>
           <a:lstStyle/>
           <a:p>
-            <a:pPr algn="l"/>
-            <a:r>
-              <a:rPr lang="en-US" dirty="0">
-                <a:solidFill>
-                  <a:srgbClr val="24292F"/>
-                </a:solidFill>
-                <a:latin typeface="-apple-system"/>
-              </a:rPr>
-              <a:t>U</a:t>
-            </a:r>
-            <a:r>
-              <a:rPr lang="en-US" b="0" i="0" dirty="0">
-                <a:solidFill>
-                  <a:srgbClr val="24292F"/>
-                </a:solidFill>
-                <a:effectLst/>
-                <a:latin typeface="-apple-system"/>
-              </a:rPr>
-              <a:t>sing the AdventureWorks2012 Database</a:t>
-            </a:r>
-          </a:p>
-          <a:p>
-            <a:pPr lvl="1"/>
-            <a:r>
-              <a:rPr lang="en-US" dirty="0">
-                <a:solidFill>
-                  <a:srgbClr val="24292F"/>
-                </a:solidFill>
-                <a:latin typeface="-apple-system"/>
-              </a:rPr>
-              <a:t>Please open up SSMS</a:t>
-            </a:r>
-          </a:p>
-          <a:p>
-            <a:pPr lvl="1"/>
-            <a:r>
-              <a:rPr lang="en-US" b="0" i="0" dirty="0">
-                <a:solidFill>
-                  <a:srgbClr val="24292F"/>
-                </a:solidFill>
-                <a:effectLst/>
-                <a:latin typeface="-apple-system"/>
-              </a:rPr>
-              <a:t>Connect to BISS</a:t>
-            </a:r>
-          </a:p>
-          <a:p>
-            <a:pPr lvl="2"/>
-            <a:r>
-              <a:rPr lang="en-US" b="0" i="0" dirty="0">
-                <a:solidFill>
-                  <a:srgbClr val="24292F"/>
-                </a:solidFill>
-                <a:effectLst/>
-                <a:latin typeface="-apple-system"/>
-              </a:rPr>
-              <a:t>Server = mss-p1-biss-01</a:t>
-            </a:r>
-          </a:p>
-          <a:p>
-            <a:pPr marL="0" indent="0">
-              <a:buNone/>
-            </a:pPr>
-            <a:endParaRPr lang="en-US" b="0" i="0" dirty="0">
-              <a:solidFill>
-                <a:srgbClr val="24292F"/>
-              </a:solidFill>
-              <a:effectLst/>
-              <a:latin typeface="-apple-system"/>
-            </a:endParaRPr>
-          </a:p>
-          <a:p>
-            <a:pPr marL="0" indent="0" algn="l">
-              <a:buNone/>
-            </a:pPr>
-            <a:endParaRPr lang="en-US" b="0" i="0" dirty="0">
-              <a:solidFill>
-                <a:srgbClr val="24292F"/>
-              </a:solidFill>
-              <a:effectLst/>
-              <a:latin typeface="-apple-system"/>
-            </a:endParaRPr>
-          </a:p>
-          <a:p>
-            <a:pPr marL="0" indent="0" algn="l">
-              <a:buNone/>
-            </a:pPr>
-            <a:endParaRPr lang="en-US" b="0" i="0" dirty="0">
-              <a:solidFill>
-                <a:srgbClr val="24292F"/>
-              </a:solidFill>
-              <a:effectLst/>
-              <a:latin typeface="-apple-system"/>
-            </a:endParaRPr>
-          </a:p>
-        </p:txBody>
-      </p:sp>
-      <p:pic>
-        <p:nvPicPr>
-          <p:cNvPr id="2" name="Picture 1">
-            <a:extLst>
-              <a:ext uri="{FF2B5EF4-FFF2-40B4-BE49-F238E27FC236}">
-                <a16:creationId xmlns:a16="http://schemas.microsoft.com/office/drawing/2014/main" id="{7C73B60A-9D72-9725-CF53-6F536A38C53C}"/>
-              </a:ext>
-            </a:extLst>
-          </p:cNvPr>
-          <p:cNvPicPr>
-            <a:picLocks noChangeAspect="1"/>
-          </p:cNvPicPr>
-          <p:nvPr/>
-        </p:nvPicPr>
-        <p:blipFill>
-          <a:blip r:embed="rId2"/>
-          <a:stretch>
-            <a:fillRect/>
-          </a:stretch>
-        </p:blipFill>
-        <p:spPr>
-          <a:xfrm>
-            <a:off x="1808367" y="2943224"/>
-            <a:ext cx="4808896" cy="3171825"/>
-          </a:xfrm>
-          <a:prstGeom prst="rect">
-            <a:avLst/>
-          </a:prstGeom>
-        </p:spPr>
-      </p:pic>
-    </p:spTree>
-    <p:extLst>
-      <p:ext uri="{BB962C8B-B14F-4D97-AF65-F5344CB8AC3E}">
-        <p14:creationId xmlns:p14="http://schemas.microsoft.com/office/powerpoint/2010/main" val="146600374"/>
-      </p:ext>
-    </p:extLst>
-  </p:cSld>
-  <p:clrMapOvr>
-    <a:masterClrMapping/>
-  </p:clrMapOvr>
-</p:sld>
-</file>
-
-<file path=ppt/slides/slide31.xml><?xml version="1.0" encoding="utf-8"?>
-<p:sld xmlns:a="http://schemas.openxmlformats.org/drawingml/2006/main" xmlns:r="http://schemas.openxmlformats.org/officeDocument/2006/relationships" xmlns:p="http://schemas.openxmlformats.org/presentationml/2006/main">
-  <p:cSld>
-    <p:spTree>
-      <p:nvGrpSpPr>
-        <p:cNvPr id="1" name=""/>
-        <p:cNvGrpSpPr/>
-        <p:nvPr/>
-      </p:nvGrpSpPr>
-      <p:grpSpPr>
-        <a:xfrm>
-          <a:off x="0" y="0"/>
-          <a:ext cx="0" cy="0"/>
-          <a:chOff x="0" y="0"/>
-          <a:chExt cx="0" cy="0"/>
-        </a:xfrm>
-      </p:grpSpPr>
-      <p:sp>
-        <p:nvSpPr>
-          <p:cNvPr id="8" name="Subtitle 2">
-            <a:extLst>
-              <a:ext uri="{FF2B5EF4-FFF2-40B4-BE49-F238E27FC236}">
-                <a16:creationId xmlns:a16="http://schemas.microsoft.com/office/drawing/2014/main" id="{090EFA5F-2C72-42AB-A069-51AFDC27C766}"/>
-              </a:ext>
-            </a:extLst>
-          </p:cNvPr>
-          <p:cNvSpPr txBox="1">
-            <a:spLocks/>
-          </p:cNvSpPr>
-          <p:nvPr/>
-        </p:nvSpPr>
-        <p:spPr>
-          <a:xfrm>
-            <a:off x="778079" y="4099775"/>
-            <a:ext cx="6400800" cy="1237021"/>
-          </a:xfrm>
-        </p:spPr>
-        <p:txBody>
-          <a:bodyPr/>
-          <a:lstStyle>
-            <a:lvl1pPr marL="0" indent="0" algn="l" defTabSz="457200" rtl="0" eaLnBrk="0" fontAlgn="base" hangingPunct="0">
-              <a:spcBef>
-                <a:spcPct val="20000"/>
-              </a:spcBef>
-              <a:spcAft>
-                <a:spcPct val="0"/>
-              </a:spcAft>
-              <a:buFont typeface="Arial" panose="020B0604020202020204" pitchFamily="34" charset="0"/>
-              <a:buNone/>
-              <a:defRPr sz="1800" kern="1200">
-                <a:solidFill>
-                  <a:srgbClr val="0FA7B5"/>
-                </a:solidFill>
-                <a:latin typeface="+mn-lt"/>
-                <a:ea typeface="MS PGothic" panose="020B0600070205080204" pitchFamily="34" charset="-128"/>
-                <a:cs typeface="ＭＳ Ｐゴシック" charset="0"/>
-              </a:defRPr>
-            </a:lvl1pPr>
-            <a:lvl2pPr marL="342900" indent="0" algn="l" defTabSz="457200" rtl="0" eaLnBrk="0" fontAlgn="base" hangingPunct="0">
-              <a:spcBef>
-                <a:spcPct val="20000"/>
-              </a:spcBef>
-              <a:spcAft>
-                <a:spcPct val="0"/>
-              </a:spcAft>
-              <a:buFont typeface="Arial" panose="020B0604020202020204" pitchFamily="34" charset="0"/>
-              <a:buNone/>
-              <a:defRPr sz="1500" kern="1200">
-                <a:solidFill>
-                  <a:schemeClr val="tx1">
-                    <a:tint val="75000"/>
-                  </a:schemeClr>
-                </a:solidFill>
-                <a:latin typeface="+mn-lt"/>
-                <a:ea typeface="MS PGothic" panose="020B0600070205080204" pitchFamily="34" charset="-128"/>
-                <a:cs typeface="+mn-cs"/>
-              </a:defRPr>
-            </a:lvl2pPr>
-            <a:lvl3pPr marL="685800" indent="0" algn="l" defTabSz="457200" rtl="0" eaLnBrk="0" fontAlgn="base" hangingPunct="0">
-              <a:spcBef>
-                <a:spcPct val="20000"/>
-              </a:spcBef>
-              <a:spcAft>
-                <a:spcPct val="0"/>
-              </a:spcAft>
-              <a:buFont typeface="Arial" panose="020B0604020202020204" pitchFamily="34" charset="0"/>
-              <a:buNone/>
-              <a:defRPr sz="1350" kern="1200">
-                <a:solidFill>
-                  <a:schemeClr val="tx1">
-                    <a:tint val="75000"/>
-                  </a:schemeClr>
-                </a:solidFill>
-                <a:latin typeface="+mn-lt"/>
-                <a:ea typeface="MS PGothic" panose="020B0600070205080204" pitchFamily="34" charset="-128"/>
-                <a:cs typeface="+mn-cs"/>
-              </a:defRPr>
-            </a:lvl3pPr>
-            <a:lvl4pPr marL="1028700" indent="0" algn="l" defTabSz="457200" rtl="0" eaLnBrk="0" fontAlgn="base" hangingPunct="0">
-              <a:spcBef>
-                <a:spcPct val="20000"/>
-              </a:spcBef>
-              <a:spcAft>
-                <a:spcPct val="0"/>
-              </a:spcAft>
-              <a:buFont typeface="Arial" panose="020B0604020202020204" pitchFamily="34" charset="0"/>
-              <a:buNone/>
-              <a:defRPr sz="1200" kern="1200">
-                <a:solidFill>
-                  <a:schemeClr val="tx1">
-                    <a:tint val="75000"/>
-                  </a:schemeClr>
-                </a:solidFill>
-                <a:latin typeface="+mn-lt"/>
-                <a:ea typeface="MS PGothic" panose="020B0600070205080204" pitchFamily="34" charset="-128"/>
-                <a:cs typeface="+mn-cs"/>
-              </a:defRPr>
-            </a:lvl4pPr>
-            <a:lvl5pPr marL="1371600" indent="0" algn="l" defTabSz="457200" rtl="0" eaLnBrk="0" fontAlgn="base" hangingPunct="0">
-              <a:spcBef>
-                <a:spcPct val="20000"/>
-              </a:spcBef>
-              <a:spcAft>
-                <a:spcPct val="0"/>
-              </a:spcAft>
-              <a:buFont typeface="Arial" panose="020B0604020202020204" pitchFamily="34" charset="0"/>
-              <a:buNone/>
-              <a:defRPr sz="1200" kern="1200">
-                <a:solidFill>
-                  <a:schemeClr val="tx1">
-                    <a:tint val="75000"/>
-                  </a:schemeClr>
-                </a:solidFill>
-                <a:latin typeface="+mn-lt"/>
-                <a:ea typeface="MS PGothic" panose="020B0600070205080204" pitchFamily="34" charset="-128"/>
-                <a:cs typeface="+mn-cs"/>
-              </a:defRPr>
-            </a:lvl5pPr>
-            <a:lvl6pPr marL="1714500" indent="0" algn="l" defTabSz="457200" rtl="0" eaLnBrk="1" latinLnBrk="0" hangingPunct="1">
-              <a:spcBef>
-                <a:spcPct val="20000"/>
-              </a:spcBef>
-              <a:buFont typeface="Arial"/>
-              <a:buNone/>
-              <a:defRPr sz="1200" kern="1200">
-                <a:solidFill>
-                  <a:schemeClr val="tx1">
-                    <a:tint val="75000"/>
-                  </a:schemeClr>
-                </a:solidFill>
-                <a:latin typeface="+mn-lt"/>
-                <a:ea typeface="+mn-ea"/>
-                <a:cs typeface="+mn-cs"/>
-              </a:defRPr>
-            </a:lvl6pPr>
-            <a:lvl7pPr marL="2057400" indent="0" algn="l" defTabSz="457200" rtl="0" eaLnBrk="1" latinLnBrk="0" hangingPunct="1">
-              <a:spcBef>
-                <a:spcPct val="20000"/>
-              </a:spcBef>
-              <a:buFont typeface="Arial"/>
-              <a:buNone/>
-              <a:defRPr sz="1200" kern="1200">
-                <a:solidFill>
-                  <a:schemeClr val="tx1">
-                    <a:tint val="75000"/>
-                  </a:schemeClr>
-                </a:solidFill>
-                <a:latin typeface="+mn-lt"/>
-                <a:ea typeface="+mn-ea"/>
-                <a:cs typeface="+mn-cs"/>
-              </a:defRPr>
-            </a:lvl7pPr>
-            <a:lvl8pPr marL="2400300" indent="0" algn="l" defTabSz="457200" rtl="0" eaLnBrk="1" latinLnBrk="0" hangingPunct="1">
-              <a:spcBef>
-                <a:spcPct val="20000"/>
-              </a:spcBef>
-              <a:buFont typeface="Arial"/>
-              <a:buNone/>
-              <a:defRPr sz="1200" kern="1200">
-                <a:solidFill>
-                  <a:schemeClr val="tx1">
-                    <a:tint val="75000"/>
-                  </a:schemeClr>
-                </a:solidFill>
-                <a:latin typeface="+mn-lt"/>
-                <a:ea typeface="+mn-ea"/>
-                <a:cs typeface="+mn-cs"/>
-              </a:defRPr>
-            </a:lvl8pPr>
-            <a:lvl9pPr marL="2743200" indent="0" algn="l" defTabSz="457200" rtl="0" eaLnBrk="1" latinLnBrk="0" hangingPunct="1">
-              <a:spcBef>
-                <a:spcPct val="20000"/>
-              </a:spcBef>
-              <a:buFont typeface="Arial"/>
-              <a:buNone/>
-              <a:defRPr sz="1200" kern="1200">
-                <a:solidFill>
-                  <a:schemeClr val="tx1">
-                    <a:tint val="75000"/>
-                  </a:schemeClr>
-                </a:solidFill>
-                <a:latin typeface="+mn-lt"/>
-                <a:ea typeface="+mn-ea"/>
-                <a:cs typeface="+mn-cs"/>
-              </a:defRPr>
-            </a:lvl9pPr>
-          </a:lstStyle>
-          <a:p>
-            <a:pPr marL="285750" lvl="0" indent="-285750">
-              <a:spcAft>
-                <a:spcPts val="600"/>
-              </a:spcAft>
-              <a:buFont typeface="Arial" panose="020B0604020202020204" pitchFamily="34" charset="0"/>
-              <a:buChar char="•"/>
-            </a:pPr>
-            <a:endParaRPr lang="en-US" altLang="en-US" dirty="0"/>
-          </a:p>
-        </p:txBody>
-      </p:sp>
-      <p:sp>
-        <p:nvSpPr>
-          <p:cNvPr id="5" name="Title 4">
-            <a:extLst>
-              <a:ext uri="{FF2B5EF4-FFF2-40B4-BE49-F238E27FC236}">
-                <a16:creationId xmlns:a16="http://schemas.microsoft.com/office/drawing/2014/main" id="{B7278418-EB2A-8766-EC92-613B2ACBA277}"/>
-              </a:ext>
-            </a:extLst>
-          </p:cNvPr>
-          <p:cNvSpPr>
-            <a:spLocks noGrp="1"/>
-          </p:cNvSpPr>
-          <p:nvPr>
-            <p:ph type="title"/>
-          </p:nvPr>
-        </p:nvSpPr>
-        <p:spPr>
-          <a:xfrm>
-            <a:off x="400050" y="119939"/>
-            <a:ext cx="8229600" cy="428312"/>
-          </a:xfrm>
-        </p:spPr>
-        <p:txBody>
-          <a:bodyPr/>
-          <a:lstStyle/>
-          <a:p>
-            <a:r>
-              <a:rPr lang="en-US" dirty="0"/>
-              <a:t>Hands On Examples</a:t>
-            </a:r>
-          </a:p>
-        </p:txBody>
-      </p:sp>
-      <p:sp>
-        <p:nvSpPr>
-          <p:cNvPr id="7" name="Content Placeholder 6">
-            <a:extLst>
-              <a:ext uri="{FF2B5EF4-FFF2-40B4-BE49-F238E27FC236}">
-                <a16:creationId xmlns:a16="http://schemas.microsoft.com/office/drawing/2014/main" id="{8103113D-3FA7-10C8-CFF6-CF0FA3CF28D4}"/>
-              </a:ext>
-            </a:extLst>
-          </p:cNvPr>
-          <p:cNvSpPr>
-            <a:spLocks noGrp="1"/>
-          </p:cNvSpPr>
-          <p:nvPr>
-            <p:ph idx="1"/>
-          </p:nvPr>
-        </p:nvSpPr>
-        <p:spPr>
-          <a:xfrm>
-            <a:off x="400050" y="1225062"/>
-            <a:ext cx="8229600" cy="5002701"/>
-          </a:xfrm>
-        </p:spPr>
-        <p:txBody>
-          <a:bodyPr/>
-          <a:lstStyle/>
-          <a:p>
-            <a:r>
-              <a:rPr lang="en-US" b="0" i="0" dirty="0">
-                <a:solidFill>
-                  <a:srgbClr val="24292F"/>
-                </a:solidFill>
-                <a:effectLst/>
-                <a:latin typeface="-apple-system"/>
-              </a:rPr>
-              <a:t>Click File -&gt; Open -&gt; File</a:t>
-            </a:r>
-          </a:p>
-          <a:p>
-            <a:endParaRPr lang="en-US" b="0" i="0" dirty="0">
-              <a:solidFill>
-                <a:srgbClr val="24292F"/>
-              </a:solidFill>
-              <a:effectLst/>
-              <a:latin typeface="-apple-system"/>
-            </a:endParaRPr>
-          </a:p>
-          <a:p>
-            <a:pPr lvl="1"/>
-            <a:endParaRPr lang="en-US" b="0" i="0" dirty="0">
-              <a:solidFill>
-                <a:srgbClr val="24292F"/>
-              </a:solidFill>
-              <a:effectLst/>
-              <a:latin typeface="-apple-system"/>
-            </a:endParaRPr>
-          </a:p>
-          <a:p>
-            <a:pPr marL="0" indent="0">
-              <a:buNone/>
-            </a:pPr>
-            <a:endParaRPr lang="en-US" b="0" i="0" dirty="0">
-              <a:solidFill>
-                <a:srgbClr val="24292F"/>
-              </a:solidFill>
-              <a:effectLst/>
-              <a:latin typeface="-apple-system"/>
-            </a:endParaRPr>
-          </a:p>
-          <a:p>
-            <a:pPr marL="0" indent="0" algn="l">
-              <a:buNone/>
-            </a:pPr>
-            <a:endParaRPr lang="en-US" b="0" i="0" dirty="0">
-              <a:solidFill>
-                <a:srgbClr val="24292F"/>
-              </a:solidFill>
-              <a:effectLst/>
-              <a:latin typeface="-apple-system"/>
-            </a:endParaRPr>
-          </a:p>
-          <a:p>
-            <a:pPr marL="0" indent="0" algn="l">
-              <a:buNone/>
-            </a:pPr>
-            <a:endParaRPr lang="en-US" b="0" i="0" dirty="0">
-              <a:solidFill>
-                <a:srgbClr val="24292F"/>
-              </a:solidFill>
-              <a:effectLst/>
-              <a:latin typeface="-apple-system"/>
-            </a:endParaRPr>
-          </a:p>
-        </p:txBody>
-      </p:sp>
-      <p:pic>
-        <p:nvPicPr>
-          <p:cNvPr id="4" name="Picture 3">
-            <a:extLst>
-              <a:ext uri="{FF2B5EF4-FFF2-40B4-BE49-F238E27FC236}">
-                <a16:creationId xmlns:a16="http://schemas.microsoft.com/office/drawing/2014/main" id="{9913EA44-DE34-7A79-B7FD-95E417CE2AD5}"/>
-              </a:ext>
-            </a:extLst>
-          </p:cNvPr>
-          <p:cNvPicPr>
-            <a:picLocks noChangeAspect="1"/>
-          </p:cNvPicPr>
-          <p:nvPr/>
-        </p:nvPicPr>
-        <p:blipFill>
-          <a:blip r:embed="rId2"/>
-          <a:stretch>
-            <a:fillRect/>
-          </a:stretch>
-        </p:blipFill>
-        <p:spPr>
-          <a:xfrm>
-            <a:off x="1363762" y="2084652"/>
-            <a:ext cx="6193146" cy="3605436"/>
-          </a:xfrm>
-          <a:prstGeom prst="rect">
-            <a:avLst/>
-          </a:prstGeom>
-        </p:spPr>
-      </p:pic>
-    </p:spTree>
-    <p:extLst>
-      <p:ext uri="{BB962C8B-B14F-4D97-AF65-F5344CB8AC3E}">
-        <p14:creationId xmlns:p14="http://schemas.microsoft.com/office/powerpoint/2010/main" val="1451264872"/>
-      </p:ext>
-    </p:extLst>
-  </p:cSld>
-  <p:clrMapOvr>
-    <a:masterClrMapping/>
-  </p:clrMapOvr>
-</p:sld>
-</file>
-
-<file path=ppt/slides/slide32.xml><?xml version="1.0" encoding="utf-8"?>
-<p:sld xmlns:a="http://schemas.openxmlformats.org/drawingml/2006/main" xmlns:r="http://schemas.openxmlformats.org/officeDocument/2006/relationships" xmlns:p="http://schemas.openxmlformats.org/presentationml/2006/main">
-  <p:cSld>
-    <p:spTree>
-      <p:nvGrpSpPr>
-        <p:cNvPr id="1" name=""/>
-        <p:cNvGrpSpPr/>
-        <p:nvPr/>
-      </p:nvGrpSpPr>
-      <p:grpSpPr>
-        <a:xfrm>
-          <a:off x="0" y="0"/>
-          <a:ext cx="0" cy="0"/>
-          <a:chOff x="0" y="0"/>
-          <a:chExt cx="0" cy="0"/>
-        </a:xfrm>
-      </p:grpSpPr>
-      <p:sp>
-        <p:nvSpPr>
-          <p:cNvPr id="8" name="Subtitle 2">
-            <a:extLst>
-              <a:ext uri="{FF2B5EF4-FFF2-40B4-BE49-F238E27FC236}">
-                <a16:creationId xmlns:a16="http://schemas.microsoft.com/office/drawing/2014/main" id="{090EFA5F-2C72-42AB-A069-51AFDC27C766}"/>
-              </a:ext>
-            </a:extLst>
-          </p:cNvPr>
-          <p:cNvSpPr txBox="1">
-            <a:spLocks/>
-          </p:cNvSpPr>
-          <p:nvPr/>
-        </p:nvSpPr>
-        <p:spPr>
-          <a:xfrm>
-            <a:off x="778079" y="4099775"/>
-            <a:ext cx="6400800" cy="1237021"/>
-          </a:xfrm>
-        </p:spPr>
-        <p:txBody>
-          <a:bodyPr/>
-          <a:lstStyle>
-            <a:lvl1pPr marL="0" indent="0" algn="l" defTabSz="457200" rtl="0" eaLnBrk="0" fontAlgn="base" hangingPunct="0">
-              <a:spcBef>
-                <a:spcPct val="20000"/>
-              </a:spcBef>
-              <a:spcAft>
-                <a:spcPct val="0"/>
-              </a:spcAft>
-              <a:buFont typeface="Arial" panose="020B0604020202020204" pitchFamily="34" charset="0"/>
-              <a:buNone/>
-              <a:defRPr sz="1800" kern="1200">
-                <a:solidFill>
-                  <a:srgbClr val="0FA7B5"/>
-                </a:solidFill>
-                <a:latin typeface="+mn-lt"/>
-                <a:ea typeface="MS PGothic" panose="020B0600070205080204" pitchFamily="34" charset="-128"/>
-                <a:cs typeface="ＭＳ Ｐゴシック" charset="0"/>
-              </a:defRPr>
-            </a:lvl1pPr>
-            <a:lvl2pPr marL="342900" indent="0" algn="l" defTabSz="457200" rtl="0" eaLnBrk="0" fontAlgn="base" hangingPunct="0">
-              <a:spcBef>
-                <a:spcPct val="20000"/>
-              </a:spcBef>
-              <a:spcAft>
-                <a:spcPct val="0"/>
-              </a:spcAft>
-              <a:buFont typeface="Arial" panose="020B0604020202020204" pitchFamily="34" charset="0"/>
-              <a:buNone/>
-              <a:defRPr sz="1500" kern="1200">
-                <a:solidFill>
-                  <a:schemeClr val="tx1">
-                    <a:tint val="75000"/>
-                  </a:schemeClr>
-                </a:solidFill>
-                <a:latin typeface="+mn-lt"/>
-                <a:ea typeface="MS PGothic" panose="020B0600070205080204" pitchFamily="34" charset="-128"/>
-                <a:cs typeface="+mn-cs"/>
-              </a:defRPr>
-            </a:lvl2pPr>
-            <a:lvl3pPr marL="685800" indent="0" algn="l" defTabSz="457200" rtl="0" eaLnBrk="0" fontAlgn="base" hangingPunct="0">
-              <a:spcBef>
-                <a:spcPct val="20000"/>
-              </a:spcBef>
-              <a:spcAft>
-                <a:spcPct val="0"/>
-              </a:spcAft>
-              <a:buFont typeface="Arial" panose="020B0604020202020204" pitchFamily="34" charset="0"/>
-              <a:buNone/>
-              <a:defRPr sz="1350" kern="1200">
-                <a:solidFill>
-                  <a:schemeClr val="tx1">
-                    <a:tint val="75000"/>
-                  </a:schemeClr>
-                </a:solidFill>
-                <a:latin typeface="+mn-lt"/>
-                <a:ea typeface="MS PGothic" panose="020B0600070205080204" pitchFamily="34" charset="-128"/>
-                <a:cs typeface="+mn-cs"/>
-              </a:defRPr>
-            </a:lvl3pPr>
-            <a:lvl4pPr marL="1028700" indent="0" algn="l" defTabSz="457200" rtl="0" eaLnBrk="0" fontAlgn="base" hangingPunct="0">
-              <a:spcBef>
-                <a:spcPct val="20000"/>
-              </a:spcBef>
-              <a:spcAft>
-                <a:spcPct val="0"/>
-              </a:spcAft>
-              <a:buFont typeface="Arial" panose="020B0604020202020204" pitchFamily="34" charset="0"/>
-              <a:buNone/>
-              <a:defRPr sz="1200" kern="1200">
-                <a:solidFill>
-                  <a:schemeClr val="tx1">
-                    <a:tint val="75000"/>
-                  </a:schemeClr>
-                </a:solidFill>
-                <a:latin typeface="+mn-lt"/>
-                <a:ea typeface="MS PGothic" panose="020B0600070205080204" pitchFamily="34" charset="-128"/>
-                <a:cs typeface="+mn-cs"/>
-              </a:defRPr>
-            </a:lvl4pPr>
-            <a:lvl5pPr marL="1371600" indent="0" algn="l" defTabSz="457200" rtl="0" eaLnBrk="0" fontAlgn="base" hangingPunct="0">
-              <a:spcBef>
-                <a:spcPct val="20000"/>
-              </a:spcBef>
-              <a:spcAft>
-                <a:spcPct val="0"/>
-              </a:spcAft>
-              <a:buFont typeface="Arial" panose="020B0604020202020204" pitchFamily="34" charset="0"/>
-              <a:buNone/>
-              <a:defRPr sz="1200" kern="1200">
-                <a:solidFill>
-                  <a:schemeClr val="tx1">
-                    <a:tint val="75000"/>
-                  </a:schemeClr>
-                </a:solidFill>
-                <a:latin typeface="+mn-lt"/>
-                <a:ea typeface="MS PGothic" panose="020B0600070205080204" pitchFamily="34" charset="-128"/>
-                <a:cs typeface="+mn-cs"/>
-              </a:defRPr>
-            </a:lvl5pPr>
-            <a:lvl6pPr marL="1714500" indent="0" algn="l" defTabSz="457200" rtl="0" eaLnBrk="1" latinLnBrk="0" hangingPunct="1">
-              <a:spcBef>
-                <a:spcPct val="20000"/>
-              </a:spcBef>
-              <a:buFont typeface="Arial"/>
-              <a:buNone/>
-              <a:defRPr sz="1200" kern="1200">
-                <a:solidFill>
-                  <a:schemeClr val="tx1">
-                    <a:tint val="75000"/>
-                  </a:schemeClr>
-                </a:solidFill>
-                <a:latin typeface="+mn-lt"/>
-                <a:ea typeface="+mn-ea"/>
-                <a:cs typeface="+mn-cs"/>
-              </a:defRPr>
-            </a:lvl6pPr>
-            <a:lvl7pPr marL="2057400" indent="0" algn="l" defTabSz="457200" rtl="0" eaLnBrk="1" latinLnBrk="0" hangingPunct="1">
-              <a:spcBef>
-                <a:spcPct val="20000"/>
-              </a:spcBef>
-              <a:buFont typeface="Arial"/>
-              <a:buNone/>
-              <a:defRPr sz="1200" kern="1200">
-                <a:solidFill>
-                  <a:schemeClr val="tx1">
-                    <a:tint val="75000"/>
-                  </a:schemeClr>
-                </a:solidFill>
-                <a:latin typeface="+mn-lt"/>
-                <a:ea typeface="+mn-ea"/>
-                <a:cs typeface="+mn-cs"/>
-              </a:defRPr>
-            </a:lvl7pPr>
-            <a:lvl8pPr marL="2400300" indent="0" algn="l" defTabSz="457200" rtl="0" eaLnBrk="1" latinLnBrk="0" hangingPunct="1">
-              <a:spcBef>
-                <a:spcPct val="20000"/>
-              </a:spcBef>
-              <a:buFont typeface="Arial"/>
-              <a:buNone/>
-              <a:defRPr sz="1200" kern="1200">
-                <a:solidFill>
-                  <a:schemeClr val="tx1">
-                    <a:tint val="75000"/>
-                  </a:schemeClr>
-                </a:solidFill>
-                <a:latin typeface="+mn-lt"/>
-                <a:ea typeface="+mn-ea"/>
-                <a:cs typeface="+mn-cs"/>
-              </a:defRPr>
-            </a:lvl8pPr>
-            <a:lvl9pPr marL="2743200" indent="0" algn="l" defTabSz="457200" rtl="0" eaLnBrk="1" latinLnBrk="0" hangingPunct="1">
-              <a:spcBef>
-                <a:spcPct val="20000"/>
-              </a:spcBef>
-              <a:buFont typeface="Arial"/>
-              <a:buNone/>
-              <a:defRPr sz="1200" kern="1200">
-                <a:solidFill>
-                  <a:schemeClr val="tx1">
-                    <a:tint val="75000"/>
-                  </a:schemeClr>
-                </a:solidFill>
-                <a:latin typeface="+mn-lt"/>
-                <a:ea typeface="+mn-ea"/>
-                <a:cs typeface="+mn-cs"/>
-              </a:defRPr>
-            </a:lvl9pPr>
-          </a:lstStyle>
-          <a:p>
-            <a:pPr marL="285750" lvl="0" indent="-285750">
-              <a:spcAft>
-                <a:spcPts val="600"/>
-              </a:spcAft>
-              <a:buFont typeface="Arial" panose="020B0604020202020204" pitchFamily="34" charset="0"/>
-              <a:buChar char="•"/>
-            </a:pPr>
-            <a:endParaRPr lang="en-US" altLang="en-US" dirty="0"/>
-          </a:p>
-        </p:txBody>
-      </p:sp>
-      <p:sp>
-        <p:nvSpPr>
-          <p:cNvPr id="5" name="Title 4">
-            <a:extLst>
-              <a:ext uri="{FF2B5EF4-FFF2-40B4-BE49-F238E27FC236}">
-                <a16:creationId xmlns:a16="http://schemas.microsoft.com/office/drawing/2014/main" id="{B7278418-EB2A-8766-EC92-613B2ACBA277}"/>
-              </a:ext>
-            </a:extLst>
-          </p:cNvPr>
-          <p:cNvSpPr>
-            <a:spLocks noGrp="1"/>
-          </p:cNvSpPr>
-          <p:nvPr>
-            <p:ph type="title"/>
-          </p:nvPr>
-        </p:nvSpPr>
-        <p:spPr>
-          <a:xfrm>
-            <a:off x="400050" y="119939"/>
-            <a:ext cx="8229600" cy="428312"/>
-          </a:xfrm>
-        </p:spPr>
-        <p:txBody>
-          <a:bodyPr/>
-          <a:lstStyle/>
-          <a:p>
-            <a:r>
-              <a:rPr lang="en-US" dirty="0"/>
-              <a:t>Hands On Examples</a:t>
-            </a:r>
-          </a:p>
-        </p:txBody>
-      </p:sp>
-      <p:sp>
-        <p:nvSpPr>
-          <p:cNvPr id="7" name="Content Placeholder 6">
-            <a:extLst>
-              <a:ext uri="{FF2B5EF4-FFF2-40B4-BE49-F238E27FC236}">
-                <a16:creationId xmlns:a16="http://schemas.microsoft.com/office/drawing/2014/main" id="{8103113D-3FA7-10C8-CFF6-CF0FA3CF28D4}"/>
-              </a:ext>
-            </a:extLst>
-          </p:cNvPr>
-          <p:cNvSpPr>
-            <a:spLocks noGrp="1"/>
-          </p:cNvSpPr>
-          <p:nvPr>
-            <p:ph idx="1"/>
-          </p:nvPr>
-        </p:nvSpPr>
-        <p:spPr>
-          <a:xfrm>
-            <a:off x="400050" y="1225062"/>
-            <a:ext cx="8229600" cy="5002701"/>
-          </a:xfrm>
-        </p:spPr>
-        <p:txBody>
-          <a:bodyPr/>
-          <a:lstStyle/>
-          <a:p>
-            <a:r>
-              <a:rPr lang="en-US" b="0" i="0" dirty="0">
-                <a:solidFill>
-                  <a:srgbClr val="24292F"/>
-                </a:solidFill>
-                <a:effectLst/>
-                <a:latin typeface="-apple-system"/>
-              </a:rPr>
-              <a:t>Open the SQL Day </a:t>
-            </a:r>
-            <a:r>
-              <a:rPr lang="en-US" dirty="0">
-                <a:solidFill>
-                  <a:srgbClr val="24292F"/>
-                </a:solidFill>
-                <a:latin typeface="-apple-system"/>
-              </a:rPr>
-              <a:t>4</a:t>
-            </a:r>
-            <a:r>
-              <a:rPr lang="en-US" b="0" i="0" dirty="0">
-                <a:solidFill>
-                  <a:srgbClr val="24292F"/>
-                </a:solidFill>
-                <a:effectLst/>
-                <a:latin typeface="-apple-system"/>
-              </a:rPr>
-              <a:t> Joins </a:t>
-            </a:r>
-            <a:r>
-              <a:rPr lang="en-US" b="0" i="0" dirty="0" err="1">
-                <a:solidFill>
-                  <a:srgbClr val="24292F"/>
-                </a:solidFill>
-                <a:effectLst/>
-                <a:latin typeface="-apple-system"/>
-              </a:rPr>
-              <a:t>Script.sql</a:t>
-            </a:r>
-            <a:r>
-              <a:rPr lang="en-US" b="0" i="0" dirty="0">
-                <a:solidFill>
-                  <a:srgbClr val="24292F"/>
-                </a:solidFill>
-                <a:effectLst/>
-                <a:latin typeface="-apple-system"/>
-              </a:rPr>
-              <a:t> file </a:t>
-            </a:r>
-          </a:p>
-          <a:p>
-            <a:pPr marL="0" indent="0">
-              <a:buNone/>
-            </a:pPr>
-            <a:endParaRPr lang="en-US" dirty="0">
-              <a:solidFill>
-                <a:srgbClr val="24292F"/>
-              </a:solidFill>
-              <a:latin typeface="-apple-system"/>
-            </a:endParaRPr>
-          </a:p>
-          <a:p>
-            <a:endParaRPr lang="en-US" b="0" i="0" dirty="0">
-              <a:solidFill>
-                <a:srgbClr val="24292F"/>
-              </a:solidFill>
-              <a:effectLst/>
-              <a:latin typeface="-apple-system"/>
-            </a:endParaRPr>
-          </a:p>
-          <a:p>
-            <a:endParaRPr lang="en-US" b="0" i="0" dirty="0">
-              <a:solidFill>
-                <a:srgbClr val="24292F"/>
-              </a:solidFill>
-              <a:effectLst/>
-              <a:latin typeface="-apple-system"/>
-            </a:endParaRPr>
-          </a:p>
-          <a:p>
-            <a:endParaRPr lang="en-US" b="0" i="0" dirty="0">
-              <a:solidFill>
-                <a:srgbClr val="24292F"/>
-              </a:solidFill>
-              <a:effectLst/>
-              <a:latin typeface="-apple-system"/>
-            </a:endParaRPr>
-          </a:p>
-          <a:p>
-            <a:pPr lvl="1"/>
-            <a:endParaRPr lang="en-US" b="0" i="0" dirty="0">
-              <a:solidFill>
-                <a:srgbClr val="24292F"/>
-              </a:solidFill>
-              <a:effectLst/>
-              <a:latin typeface="-apple-system"/>
-            </a:endParaRPr>
-          </a:p>
-          <a:p>
-            <a:pPr marL="0" indent="0">
-              <a:buNone/>
-            </a:pPr>
-            <a:endParaRPr lang="en-US" b="0" i="0" dirty="0">
-              <a:solidFill>
-                <a:srgbClr val="24292F"/>
-              </a:solidFill>
-              <a:effectLst/>
-              <a:latin typeface="-apple-system"/>
-            </a:endParaRPr>
-          </a:p>
-          <a:p>
-            <a:pPr marL="0" indent="0" algn="l">
-              <a:buNone/>
-            </a:pPr>
-            <a:endParaRPr lang="en-US" b="0" i="0" dirty="0">
-              <a:solidFill>
-                <a:srgbClr val="24292F"/>
-              </a:solidFill>
-              <a:effectLst/>
-              <a:latin typeface="-apple-system"/>
-            </a:endParaRPr>
-          </a:p>
-          <a:p>
-            <a:pPr marL="0" indent="0" algn="l">
-              <a:buNone/>
-            </a:pPr>
-            <a:endParaRPr lang="en-US" b="0" i="0" dirty="0">
-              <a:solidFill>
-                <a:srgbClr val="24292F"/>
-              </a:solidFill>
-              <a:effectLst/>
-              <a:latin typeface="-apple-system"/>
-            </a:endParaRPr>
-          </a:p>
-        </p:txBody>
-      </p:sp>
-      <p:pic>
-        <p:nvPicPr>
-          <p:cNvPr id="2" name="Picture 1">
-            <a:extLst>
-              <a:ext uri="{FF2B5EF4-FFF2-40B4-BE49-F238E27FC236}">
-                <a16:creationId xmlns:a16="http://schemas.microsoft.com/office/drawing/2014/main" id="{203BF16A-2184-581B-0E28-4ED81CBB612F}"/>
-              </a:ext>
-            </a:extLst>
-          </p:cNvPr>
-          <p:cNvPicPr>
-            <a:picLocks noChangeAspect="1"/>
-          </p:cNvPicPr>
-          <p:nvPr/>
-        </p:nvPicPr>
-        <p:blipFill>
-          <a:blip r:embed="rId3"/>
-          <a:stretch>
-            <a:fillRect/>
-          </a:stretch>
-        </p:blipFill>
-        <p:spPr>
-          <a:xfrm>
-            <a:off x="1699622" y="2073393"/>
-            <a:ext cx="4557713" cy="3066569"/>
-          </a:xfrm>
-          <a:prstGeom prst="rect">
-            <a:avLst/>
-          </a:prstGeom>
-        </p:spPr>
-      </p:pic>
-    </p:spTree>
-    <p:extLst>
-      <p:ext uri="{BB962C8B-B14F-4D97-AF65-F5344CB8AC3E}">
-        <p14:creationId xmlns:p14="http://schemas.microsoft.com/office/powerpoint/2010/main" val="1833757041"/>
-      </p:ext>
-    </p:extLst>
-  </p:cSld>
-  <p:clrMapOvr>
-    <a:masterClrMapping/>
-  </p:clrMapOvr>
-</p:sld>
-</file>
-
-<file path=ppt/slides/slide33.xml><?xml version="1.0" encoding="utf-8"?>
-<p:sld xmlns:a="http://schemas.openxmlformats.org/drawingml/2006/main" xmlns:r="http://schemas.openxmlformats.org/officeDocument/2006/relationships" xmlns:p="http://schemas.openxmlformats.org/presentationml/2006/main">
-  <p:cSld>
-    <p:spTree>
-      <p:nvGrpSpPr>
-        <p:cNvPr id="1" name=""/>
-        <p:cNvGrpSpPr/>
-        <p:nvPr/>
-      </p:nvGrpSpPr>
-      <p:grpSpPr>
-        <a:xfrm>
-          <a:off x="0" y="0"/>
-          <a:ext cx="0" cy="0"/>
-          <a:chOff x="0" y="0"/>
-          <a:chExt cx="0" cy="0"/>
-        </a:xfrm>
-      </p:grpSpPr>
-      <p:sp>
-        <p:nvSpPr>
-          <p:cNvPr id="8" name="Subtitle 2">
-            <a:extLst>
-              <a:ext uri="{FF2B5EF4-FFF2-40B4-BE49-F238E27FC236}">
-                <a16:creationId xmlns:a16="http://schemas.microsoft.com/office/drawing/2014/main" id="{090EFA5F-2C72-42AB-A069-51AFDC27C766}"/>
-              </a:ext>
-            </a:extLst>
-          </p:cNvPr>
-          <p:cNvSpPr txBox="1">
-            <a:spLocks/>
-          </p:cNvSpPr>
-          <p:nvPr/>
-        </p:nvSpPr>
-        <p:spPr>
-          <a:xfrm>
-            <a:off x="778079" y="4099775"/>
-            <a:ext cx="6400800" cy="1237021"/>
-          </a:xfrm>
-        </p:spPr>
-        <p:txBody>
-          <a:bodyPr/>
-          <a:lstStyle>
-            <a:lvl1pPr marL="0" indent="0" algn="l" defTabSz="457200" rtl="0" eaLnBrk="0" fontAlgn="base" hangingPunct="0">
-              <a:spcBef>
-                <a:spcPct val="20000"/>
-              </a:spcBef>
-              <a:spcAft>
-                <a:spcPct val="0"/>
-              </a:spcAft>
-              <a:buFont typeface="Arial" panose="020B0604020202020204" pitchFamily="34" charset="0"/>
-              <a:buNone/>
-              <a:defRPr sz="1800" kern="1200">
-                <a:solidFill>
-                  <a:srgbClr val="0FA7B5"/>
-                </a:solidFill>
-                <a:latin typeface="+mn-lt"/>
-                <a:ea typeface="MS PGothic" panose="020B0600070205080204" pitchFamily="34" charset="-128"/>
-                <a:cs typeface="ＭＳ Ｐゴシック" charset="0"/>
-              </a:defRPr>
-            </a:lvl1pPr>
-            <a:lvl2pPr marL="342900" indent="0" algn="l" defTabSz="457200" rtl="0" eaLnBrk="0" fontAlgn="base" hangingPunct="0">
-              <a:spcBef>
-                <a:spcPct val="20000"/>
-              </a:spcBef>
-              <a:spcAft>
-                <a:spcPct val="0"/>
-              </a:spcAft>
-              <a:buFont typeface="Arial" panose="020B0604020202020204" pitchFamily="34" charset="0"/>
-              <a:buNone/>
-              <a:defRPr sz="1500" kern="1200">
-                <a:solidFill>
-                  <a:schemeClr val="tx1">
-                    <a:tint val="75000"/>
-                  </a:schemeClr>
-                </a:solidFill>
-                <a:latin typeface="+mn-lt"/>
-                <a:ea typeface="MS PGothic" panose="020B0600070205080204" pitchFamily="34" charset="-128"/>
-                <a:cs typeface="+mn-cs"/>
-              </a:defRPr>
-            </a:lvl2pPr>
-            <a:lvl3pPr marL="685800" indent="0" algn="l" defTabSz="457200" rtl="0" eaLnBrk="0" fontAlgn="base" hangingPunct="0">
-              <a:spcBef>
-                <a:spcPct val="20000"/>
-              </a:spcBef>
-              <a:spcAft>
-                <a:spcPct val="0"/>
-              </a:spcAft>
-              <a:buFont typeface="Arial" panose="020B0604020202020204" pitchFamily="34" charset="0"/>
-              <a:buNone/>
-              <a:defRPr sz="1350" kern="1200">
-                <a:solidFill>
-                  <a:schemeClr val="tx1">
-                    <a:tint val="75000"/>
-                  </a:schemeClr>
-                </a:solidFill>
-                <a:latin typeface="+mn-lt"/>
-                <a:ea typeface="MS PGothic" panose="020B0600070205080204" pitchFamily="34" charset="-128"/>
-                <a:cs typeface="+mn-cs"/>
-              </a:defRPr>
-            </a:lvl3pPr>
-            <a:lvl4pPr marL="1028700" indent="0" algn="l" defTabSz="457200" rtl="0" eaLnBrk="0" fontAlgn="base" hangingPunct="0">
-              <a:spcBef>
-                <a:spcPct val="20000"/>
-              </a:spcBef>
-              <a:spcAft>
-                <a:spcPct val="0"/>
-              </a:spcAft>
-              <a:buFont typeface="Arial" panose="020B0604020202020204" pitchFamily="34" charset="0"/>
-              <a:buNone/>
-              <a:defRPr sz="1200" kern="1200">
-                <a:solidFill>
-                  <a:schemeClr val="tx1">
-                    <a:tint val="75000"/>
-                  </a:schemeClr>
-                </a:solidFill>
-                <a:latin typeface="+mn-lt"/>
-                <a:ea typeface="MS PGothic" panose="020B0600070205080204" pitchFamily="34" charset="-128"/>
-                <a:cs typeface="+mn-cs"/>
-              </a:defRPr>
-            </a:lvl4pPr>
-            <a:lvl5pPr marL="1371600" indent="0" algn="l" defTabSz="457200" rtl="0" eaLnBrk="0" fontAlgn="base" hangingPunct="0">
-              <a:spcBef>
-                <a:spcPct val="20000"/>
-              </a:spcBef>
-              <a:spcAft>
-                <a:spcPct val="0"/>
-              </a:spcAft>
-              <a:buFont typeface="Arial" panose="020B0604020202020204" pitchFamily="34" charset="0"/>
-              <a:buNone/>
-              <a:defRPr sz="1200" kern="1200">
-                <a:solidFill>
-                  <a:schemeClr val="tx1">
-                    <a:tint val="75000"/>
-                  </a:schemeClr>
-                </a:solidFill>
-                <a:latin typeface="+mn-lt"/>
-                <a:ea typeface="MS PGothic" panose="020B0600070205080204" pitchFamily="34" charset="-128"/>
-                <a:cs typeface="+mn-cs"/>
-              </a:defRPr>
-            </a:lvl5pPr>
-            <a:lvl6pPr marL="1714500" indent="0" algn="l" defTabSz="457200" rtl="0" eaLnBrk="1" latinLnBrk="0" hangingPunct="1">
-              <a:spcBef>
-                <a:spcPct val="20000"/>
-              </a:spcBef>
-              <a:buFont typeface="Arial"/>
-              <a:buNone/>
-              <a:defRPr sz="1200" kern="1200">
-                <a:solidFill>
-                  <a:schemeClr val="tx1">
-                    <a:tint val="75000"/>
-                  </a:schemeClr>
-                </a:solidFill>
-                <a:latin typeface="+mn-lt"/>
-                <a:ea typeface="+mn-ea"/>
-                <a:cs typeface="+mn-cs"/>
-              </a:defRPr>
-            </a:lvl6pPr>
-            <a:lvl7pPr marL="2057400" indent="0" algn="l" defTabSz="457200" rtl="0" eaLnBrk="1" latinLnBrk="0" hangingPunct="1">
-              <a:spcBef>
-                <a:spcPct val="20000"/>
-              </a:spcBef>
-              <a:buFont typeface="Arial"/>
-              <a:buNone/>
-              <a:defRPr sz="1200" kern="1200">
-                <a:solidFill>
-                  <a:schemeClr val="tx1">
-                    <a:tint val="75000"/>
-                  </a:schemeClr>
-                </a:solidFill>
-                <a:latin typeface="+mn-lt"/>
-                <a:ea typeface="+mn-ea"/>
-                <a:cs typeface="+mn-cs"/>
-              </a:defRPr>
-            </a:lvl7pPr>
-            <a:lvl8pPr marL="2400300" indent="0" algn="l" defTabSz="457200" rtl="0" eaLnBrk="1" latinLnBrk="0" hangingPunct="1">
-              <a:spcBef>
-                <a:spcPct val="20000"/>
-              </a:spcBef>
-              <a:buFont typeface="Arial"/>
-              <a:buNone/>
-              <a:defRPr sz="1200" kern="1200">
-                <a:solidFill>
-                  <a:schemeClr val="tx1">
-                    <a:tint val="75000"/>
-                  </a:schemeClr>
-                </a:solidFill>
-                <a:latin typeface="+mn-lt"/>
-                <a:ea typeface="+mn-ea"/>
-                <a:cs typeface="+mn-cs"/>
-              </a:defRPr>
-            </a:lvl8pPr>
-            <a:lvl9pPr marL="2743200" indent="0" algn="l" defTabSz="457200" rtl="0" eaLnBrk="1" latinLnBrk="0" hangingPunct="1">
-              <a:spcBef>
-                <a:spcPct val="20000"/>
-              </a:spcBef>
-              <a:buFont typeface="Arial"/>
-              <a:buNone/>
-              <a:defRPr sz="1200" kern="1200">
-                <a:solidFill>
-                  <a:schemeClr val="tx1">
-                    <a:tint val="75000"/>
-                  </a:schemeClr>
-                </a:solidFill>
-                <a:latin typeface="+mn-lt"/>
-                <a:ea typeface="+mn-ea"/>
-                <a:cs typeface="+mn-cs"/>
-              </a:defRPr>
-            </a:lvl9pPr>
-          </a:lstStyle>
-          <a:p>
-            <a:pPr marL="285750" lvl="0" indent="-285750">
-              <a:spcAft>
-                <a:spcPts val="600"/>
-              </a:spcAft>
-              <a:buFont typeface="Arial" panose="020B0604020202020204" pitchFamily="34" charset="0"/>
-              <a:buChar char="•"/>
-            </a:pPr>
-            <a:endParaRPr lang="en-US" altLang="en-US" dirty="0"/>
-          </a:p>
-        </p:txBody>
-      </p:sp>
-      <p:sp>
-        <p:nvSpPr>
-          <p:cNvPr id="5" name="Title 4">
-            <a:extLst>
-              <a:ext uri="{FF2B5EF4-FFF2-40B4-BE49-F238E27FC236}">
-                <a16:creationId xmlns:a16="http://schemas.microsoft.com/office/drawing/2014/main" id="{B7278418-EB2A-8766-EC92-613B2ACBA277}"/>
-              </a:ext>
-            </a:extLst>
-          </p:cNvPr>
-          <p:cNvSpPr>
-            <a:spLocks noGrp="1"/>
-          </p:cNvSpPr>
-          <p:nvPr>
-            <p:ph type="title"/>
-          </p:nvPr>
-        </p:nvSpPr>
-        <p:spPr>
-          <a:xfrm>
-            <a:off x="400050" y="119939"/>
-            <a:ext cx="8229600" cy="428312"/>
-          </a:xfrm>
-        </p:spPr>
-        <p:txBody>
-          <a:bodyPr/>
-          <a:lstStyle/>
-          <a:p>
-            <a:r>
-              <a:rPr lang="en-US" dirty="0"/>
-              <a:t>Summary</a:t>
-            </a:r>
-          </a:p>
-        </p:txBody>
-      </p:sp>
-      <p:sp>
-        <p:nvSpPr>
-          <p:cNvPr id="7" name="Content Placeholder 6">
-            <a:extLst>
-              <a:ext uri="{FF2B5EF4-FFF2-40B4-BE49-F238E27FC236}">
-                <a16:creationId xmlns:a16="http://schemas.microsoft.com/office/drawing/2014/main" id="{8103113D-3FA7-10C8-CFF6-CF0FA3CF28D4}"/>
-              </a:ext>
-            </a:extLst>
-          </p:cNvPr>
-          <p:cNvSpPr>
-            <a:spLocks noGrp="1"/>
-          </p:cNvSpPr>
-          <p:nvPr>
-            <p:ph idx="1"/>
-          </p:nvPr>
-        </p:nvSpPr>
-        <p:spPr>
-          <a:xfrm>
-            <a:off x="400050" y="1225062"/>
-            <a:ext cx="8229600" cy="5002701"/>
-          </a:xfrm>
-        </p:spPr>
-        <p:txBody>
-          <a:bodyPr/>
-          <a:lstStyle/>
-          <a:p>
             <a:r>
               <a:rPr lang="en-US" b="0" i="0" dirty="0">
                 <a:solidFill>
@@ -22952,7 +21350,7 @@
 </p:sld>
 </file>
 
-<file path=ppt/slides/slide34.xml><?xml version="1.0" encoding="utf-8"?>
+<file path=ppt/slides/slide31.xml><?xml version="1.0" encoding="utf-8"?>
 <p:sld xmlns:a="http://schemas.openxmlformats.org/drawingml/2006/main" xmlns:r="http://schemas.openxmlformats.org/officeDocument/2006/relationships" xmlns:p="http://schemas.openxmlformats.org/presentationml/2006/main">
   <p:cSld>
     <p:spTree>

</xml_diff>